<commit_message>
fixed location of image
</commit_message>
<xml_diff>
--- a/Presentation.pptx
+++ b/Presentation.pptx
@@ -2,23 +2,23 @@
 <file path=ppt/presentation.xml><?xml version="1.0" encoding="utf-8"?>
 <p:presentation xmlns:a="http://schemas.openxmlformats.org/drawingml/2006/main" xmlns:r="http://schemas.openxmlformats.org/officeDocument/2006/relationships" xmlns:p="http://schemas.openxmlformats.org/presentationml/2006/main">
   <p:sldMasterIdLst>
-    <p:sldMasterId id="2147483648" r:id="rId5"/>
+    <p:sldMasterId id="2147483648" r:id="rId1"/>
   </p:sldMasterIdLst>
   <p:notesMasterIdLst>
-    <p:notesMasterId r:id="rId7"/>
+    <p:notesMasterId r:id="rId13"/>
   </p:notesMasterIdLst>
   <p:sldIdLst>
-    <p:sldId id="256" r:id="rId8"/>
-    <p:sldId id="257" r:id="rId9"/>
-    <p:sldId id="258" r:id="rId10"/>
-    <p:sldId id="259" r:id="rId11"/>
-    <p:sldId id="260" r:id="rId12"/>
-    <p:sldId id="261" r:id="rId13"/>
-    <p:sldId id="262" r:id="rId14"/>
-    <p:sldId id="263" r:id="rId15"/>
-    <p:sldId id="264" r:id="rId16"/>
-    <p:sldId id="265" r:id="rId17"/>
-    <p:sldId id="266" r:id="rId18"/>
+    <p:sldId id="256" r:id="rId2"/>
+    <p:sldId id="257" r:id="rId3"/>
+    <p:sldId id="258" r:id="rId4"/>
+    <p:sldId id="259" r:id="rId5"/>
+    <p:sldId id="260" r:id="rId6"/>
+    <p:sldId id="261" r:id="rId7"/>
+    <p:sldId id="262" r:id="rId8"/>
+    <p:sldId id="263" r:id="rId9"/>
+    <p:sldId id="264" r:id="rId10"/>
+    <p:sldId id="265" r:id="rId11"/>
+    <p:sldId id="266" r:id="rId12"/>
   </p:sldIdLst>
   <p:sldSz cx="13004800" cy="9753600"/>
   <p:notesSz cx="6858000" cy="9144000"/>
@@ -99,13 +99,14 @@
 </p:presentation>
 </file>
 
-<file path=ppt/commentAuthors.xml><?xml version="1.0" encoding="utf-8"?>
-<p:cmAuthorLst xmlns:a="http://schemas.openxmlformats.org/drawingml/2006/main" xmlns:r="http://schemas.openxmlformats.org/officeDocument/2006/relationships" xmlns:p="http://schemas.openxmlformats.org/presentationml/2006/main"/>
-</file>
-
 <file path=ppt/notesMasters/notesMaster1.xml><?xml version="1.0" encoding="utf-8"?>
 <p:notesMaster xmlns:a="http://schemas.openxmlformats.org/drawingml/2006/main" xmlns:r="http://schemas.openxmlformats.org/officeDocument/2006/relationships" xmlns:p="http://schemas.openxmlformats.org/presentationml/2006/main">
   <p:cSld>
+    <p:bg>
+      <p:bgRef idx="1001">
+        <a:schemeClr val="bg1"/>
+      </p:bgRef>
+    </p:bg>
     <p:spTree>
       <p:nvGrpSpPr>
         <p:cNvPr id="1" name=""/>
@@ -123,7 +124,9 @@
       <p:sp>
         <p:nvSpPr>
           <p:cNvPr id="29" name="Shape 29"/>
-          <p:cNvSpPr/>
+          <p:cNvSpPr>
+            <a:spLocks noGrp="1" noRot="1" noChangeAspect="1"/>
+          </p:cNvSpPr>
           <p:nvPr>
             <p:ph type="sldImg"/>
           </p:nvPr>
@@ -142,13 +145,16 @@
           <a:lstStyle/>
           <a:p>
             <a:pPr lvl="0"/>
+            <a:endParaRPr/>
           </a:p>
         </p:txBody>
       </p:sp>
       <p:sp>
         <p:nvSpPr>
           <p:cNvPr id="30" name="Shape 30"/>
-          <p:cNvSpPr/>
+          <p:cNvSpPr>
+            <a:spLocks noGrp="1"/>
+          </p:cNvSpPr>
           <p:nvPr>
             <p:ph type="body" sz="quarter" idx="1"/>
           </p:nvPr>
@@ -167,6 +173,7 @@
           <a:lstStyle/>
           <a:p>
             <a:pPr lvl="0"/>
+            <a:endParaRPr/>
           </a:p>
         </p:txBody>
       </p:sp>
@@ -278,7 +285,7 @@
 </file>
 
 <file path=ppt/slideLayouts/slideLayout1.xml><?xml version="1.0" encoding="utf-8"?>
-<p:sldLayout xmlns:a="http://schemas.openxmlformats.org/drawingml/2006/main" xmlns:r="http://schemas.openxmlformats.org/officeDocument/2006/relationships" xmlns:p="http://schemas.openxmlformats.org/presentationml/2006/main" type="tx" showMasterSp="1" showMasterPhAnim="1">
+<p:sldLayout xmlns:a="http://schemas.openxmlformats.org/drawingml/2006/main" xmlns:r="http://schemas.openxmlformats.org/officeDocument/2006/relationships" xmlns:p="http://schemas.openxmlformats.org/presentationml/2006/main" type="tx">
   <p:cSld name="Title &amp; Subtitle">
     <p:spTree>
       <p:nvGrpSpPr>
@@ -297,7 +304,9 @@
       <p:sp>
         <p:nvSpPr>
           <p:cNvPr id="5" name="Shape 5"/>
-          <p:cNvSpPr/>
+          <p:cNvSpPr>
+            <a:spLocks noGrp="1"/>
+          </p:cNvSpPr>
           <p:nvPr>
             <p:ph type="title"/>
           </p:nvPr>
@@ -328,7 +337,9 @@
       <p:sp>
         <p:nvSpPr>
           <p:cNvPr id="6" name="Shape 6"/>
-          <p:cNvSpPr/>
+          <p:cNvSpPr>
+            <a:spLocks noGrp="1"/>
+          </p:cNvSpPr>
           <p:nvPr>
             <p:ph type="body" idx="1"/>
           </p:nvPr>
@@ -394,7 +405,6 @@
               <a:rPr sz="3200"/>
               <a:t>Body Level One</a:t>
             </a:r>
-            <a:endParaRPr sz="3200"/>
           </a:p>
           <a:p>
             <a:pPr lvl="1">
@@ -404,7 +414,6 @@
               <a:rPr sz="3200"/>
               <a:t>Body Level Two</a:t>
             </a:r>
-            <a:endParaRPr sz="3200"/>
           </a:p>
           <a:p>
             <a:pPr lvl="2">
@@ -414,7 +423,6 @@
               <a:rPr sz="3200"/>
               <a:t>Body Level Three</a:t>
             </a:r>
-            <a:endParaRPr sz="3200"/>
           </a:p>
           <a:p>
             <a:pPr lvl="3">
@@ -424,7 +432,6 @@
               <a:rPr sz="3200"/>
               <a:t>Body Level Four</a:t>
             </a:r>
-            <a:endParaRPr sz="3200"/>
           </a:p>
           <a:p>
             <a:pPr lvl="4">
@@ -442,12 +449,12 @@
   <p:clrMapOvr>
     <a:masterClrMapping/>
   </p:clrMapOvr>
-  <p:transition spd="med" advClick="1"/>
+  <p:transition spd="med"/>
 </p:sldLayout>
 </file>
 
 <file path=ppt/slideLayouts/slideLayout10.xml><?xml version="1.0" encoding="utf-8"?>
-<p:sldLayout xmlns:a="http://schemas.openxmlformats.org/drawingml/2006/main" xmlns:r="http://schemas.openxmlformats.org/officeDocument/2006/relationships" xmlns:p="http://schemas.openxmlformats.org/presentationml/2006/main" type="tx" showMasterSp="1" showMasterPhAnim="1">
+<p:sldLayout xmlns:a="http://schemas.openxmlformats.org/drawingml/2006/main" xmlns:r="http://schemas.openxmlformats.org/officeDocument/2006/relationships" xmlns:p="http://schemas.openxmlformats.org/presentationml/2006/main" type="tx">
   <p:cSld name="Quote">
     <p:spTree>
       <p:nvGrpSpPr>
@@ -468,12 +475,12 @@
   <p:clrMapOvr>
     <a:masterClrMapping/>
   </p:clrMapOvr>
-  <p:transition spd="med" advClick="1"/>
+  <p:transition spd="med"/>
 </p:sldLayout>
 </file>
 
 <file path=ppt/slideLayouts/slideLayout11.xml><?xml version="1.0" encoding="utf-8"?>
-<p:sldLayout xmlns:a="http://schemas.openxmlformats.org/drawingml/2006/main" xmlns:r="http://schemas.openxmlformats.org/officeDocument/2006/relationships" xmlns:p="http://schemas.openxmlformats.org/presentationml/2006/main" type="tx" showMasterSp="1" showMasterPhAnim="1">
+<p:sldLayout xmlns:a="http://schemas.openxmlformats.org/drawingml/2006/main" xmlns:r="http://schemas.openxmlformats.org/officeDocument/2006/relationships" xmlns:p="http://schemas.openxmlformats.org/presentationml/2006/main" type="tx">
   <p:cSld name="Photo">
     <p:spTree>
       <p:nvGrpSpPr>
@@ -494,12 +501,12 @@
   <p:clrMapOvr>
     <a:masterClrMapping/>
   </p:clrMapOvr>
-  <p:transition spd="med" advClick="1"/>
+  <p:transition spd="med"/>
 </p:sldLayout>
 </file>
 
 <file path=ppt/slideLayouts/slideLayout12.xml><?xml version="1.0" encoding="utf-8"?>
-<p:sldLayout xmlns:a="http://schemas.openxmlformats.org/drawingml/2006/main" xmlns:r="http://schemas.openxmlformats.org/officeDocument/2006/relationships" xmlns:p="http://schemas.openxmlformats.org/presentationml/2006/main" type="tx" showMasterSp="1" showMasterPhAnim="1">
+<p:sldLayout xmlns:a="http://schemas.openxmlformats.org/drawingml/2006/main" xmlns:r="http://schemas.openxmlformats.org/officeDocument/2006/relationships" xmlns:p="http://schemas.openxmlformats.org/presentationml/2006/main" type="tx">
   <p:cSld name="Blank">
     <p:spTree>
       <p:nvGrpSpPr>
@@ -520,12 +527,12 @@
   <p:clrMapOvr>
     <a:masterClrMapping/>
   </p:clrMapOvr>
-  <p:transition spd="med" advClick="1"/>
+  <p:transition spd="med"/>
 </p:sldLayout>
 </file>
 
 <file path=ppt/slideLayouts/slideLayout2.xml><?xml version="1.0" encoding="utf-8"?>
-<p:sldLayout xmlns:a="http://schemas.openxmlformats.org/drawingml/2006/main" xmlns:r="http://schemas.openxmlformats.org/officeDocument/2006/relationships" xmlns:p="http://schemas.openxmlformats.org/presentationml/2006/main" type="tx" showMasterSp="1" showMasterPhAnim="1">
+<p:sldLayout xmlns:a="http://schemas.openxmlformats.org/drawingml/2006/main" xmlns:r="http://schemas.openxmlformats.org/officeDocument/2006/relationships" xmlns:p="http://schemas.openxmlformats.org/presentationml/2006/main" type="tx">
   <p:cSld name="Photo - Horizontal">
     <p:spTree>
       <p:nvGrpSpPr>
@@ -544,7 +551,9 @@
       <p:sp>
         <p:nvSpPr>
           <p:cNvPr id="8" name="Shape 8"/>
-          <p:cNvSpPr/>
+          <p:cNvSpPr>
+            <a:spLocks noGrp="1"/>
+          </p:cNvSpPr>
           <p:nvPr>
             <p:ph type="title"/>
           </p:nvPr>
@@ -575,7 +584,9 @@
       <p:sp>
         <p:nvSpPr>
           <p:cNvPr id="9" name="Shape 9"/>
-          <p:cNvSpPr/>
+          <p:cNvSpPr>
+            <a:spLocks noGrp="1"/>
+          </p:cNvSpPr>
           <p:nvPr>
             <p:ph type="body" idx="1"/>
           </p:nvPr>
@@ -641,7 +652,6 @@
               <a:rPr sz="3200"/>
               <a:t>Body Level One</a:t>
             </a:r>
-            <a:endParaRPr sz="3200"/>
           </a:p>
           <a:p>
             <a:pPr lvl="1">
@@ -651,7 +661,6 @@
               <a:rPr sz="3200"/>
               <a:t>Body Level Two</a:t>
             </a:r>
-            <a:endParaRPr sz="3200"/>
           </a:p>
           <a:p>
             <a:pPr lvl="2">
@@ -661,7 +670,6 @@
               <a:rPr sz="3200"/>
               <a:t>Body Level Three</a:t>
             </a:r>
-            <a:endParaRPr sz="3200"/>
           </a:p>
           <a:p>
             <a:pPr lvl="3">
@@ -671,7 +679,6 @@
               <a:rPr sz="3200"/>
               <a:t>Body Level Four</a:t>
             </a:r>
-            <a:endParaRPr sz="3200"/>
           </a:p>
           <a:p>
             <a:pPr lvl="4">
@@ -689,12 +696,12 @@
   <p:clrMapOvr>
     <a:masterClrMapping/>
   </p:clrMapOvr>
-  <p:transition spd="med" advClick="1"/>
+  <p:transition spd="med"/>
 </p:sldLayout>
 </file>
 
 <file path=ppt/slideLayouts/slideLayout3.xml><?xml version="1.0" encoding="utf-8"?>
-<p:sldLayout xmlns:a="http://schemas.openxmlformats.org/drawingml/2006/main" xmlns:r="http://schemas.openxmlformats.org/officeDocument/2006/relationships" xmlns:p="http://schemas.openxmlformats.org/presentationml/2006/main" type="tx" showMasterSp="1" showMasterPhAnim="1">
+<p:sldLayout xmlns:a="http://schemas.openxmlformats.org/drawingml/2006/main" xmlns:r="http://schemas.openxmlformats.org/officeDocument/2006/relationships" xmlns:p="http://schemas.openxmlformats.org/presentationml/2006/main" type="tx">
   <p:cSld name="Title - Center">
     <p:spTree>
       <p:nvGrpSpPr>
@@ -713,7 +720,9 @@
       <p:sp>
         <p:nvSpPr>
           <p:cNvPr id="11" name="Shape 11"/>
-          <p:cNvSpPr/>
+          <p:cNvSpPr>
+            <a:spLocks noGrp="1"/>
+          </p:cNvSpPr>
           <p:nvPr>
             <p:ph type="title"/>
           </p:nvPr>
@@ -746,12 +755,12 @@
   <p:clrMapOvr>
     <a:masterClrMapping/>
   </p:clrMapOvr>
-  <p:transition spd="med" advClick="1"/>
+  <p:transition spd="med"/>
 </p:sldLayout>
 </file>
 
 <file path=ppt/slideLayouts/slideLayout4.xml><?xml version="1.0" encoding="utf-8"?>
-<p:sldLayout xmlns:a="http://schemas.openxmlformats.org/drawingml/2006/main" xmlns:r="http://schemas.openxmlformats.org/officeDocument/2006/relationships" xmlns:p="http://schemas.openxmlformats.org/presentationml/2006/main" type="tx" showMasterSp="1" showMasterPhAnim="1">
+<p:sldLayout xmlns:a="http://schemas.openxmlformats.org/drawingml/2006/main" xmlns:r="http://schemas.openxmlformats.org/officeDocument/2006/relationships" xmlns:p="http://schemas.openxmlformats.org/presentationml/2006/main" type="tx">
   <p:cSld name="Photo - Vertical">
     <p:spTree>
       <p:nvGrpSpPr>
@@ -770,7 +779,9 @@
       <p:sp>
         <p:nvSpPr>
           <p:cNvPr id="13" name="Shape 13"/>
-          <p:cNvSpPr/>
+          <p:cNvSpPr>
+            <a:spLocks noGrp="1"/>
+          </p:cNvSpPr>
           <p:nvPr>
             <p:ph type="title"/>
           </p:nvPr>
@@ -805,7 +816,9 @@
       <p:sp>
         <p:nvSpPr>
           <p:cNvPr id="14" name="Shape 14"/>
-          <p:cNvSpPr/>
+          <p:cNvSpPr>
+            <a:spLocks noGrp="1"/>
+          </p:cNvSpPr>
           <p:nvPr>
             <p:ph type="body" idx="1"/>
           </p:nvPr>
@@ -871,7 +884,6 @@
               <a:rPr sz="3200"/>
               <a:t>Body Level One</a:t>
             </a:r>
-            <a:endParaRPr sz="3200"/>
           </a:p>
           <a:p>
             <a:pPr lvl="1">
@@ -881,7 +893,6 @@
               <a:rPr sz="3200"/>
               <a:t>Body Level Two</a:t>
             </a:r>
-            <a:endParaRPr sz="3200"/>
           </a:p>
           <a:p>
             <a:pPr lvl="2">
@@ -891,7 +902,6 @@
               <a:rPr sz="3200"/>
               <a:t>Body Level Three</a:t>
             </a:r>
-            <a:endParaRPr sz="3200"/>
           </a:p>
           <a:p>
             <a:pPr lvl="3">
@@ -901,7 +911,6 @@
               <a:rPr sz="3200"/>
               <a:t>Body Level Four</a:t>
             </a:r>
-            <a:endParaRPr sz="3200"/>
           </a:p>
           <a:p>
             <a:pPr lvl="4">
@@ -919,12 +928,12 @@
   <p:clrMapOvr>
     <a:masterClrMapping/>
   </p:clrMapOvr>
-  <p:transition spd="med" advClick="1"/>
+  <p:transition spd="med"/>
 </p:sldLayout>
 </file>
 
 <file path=ppt/slideLayouts/slideLayout5.xml><?xml version="1.0" encoding="utf-8"?>
-<p:sldLayout xmlns:a="http://schemas.openxmlformats.org/drawingml/2006/main" xmlns:r="http://schemas.openxmlformats.org/officeDocument/2006/relationships" xmlns:p="http://schemas.openxmlformats.org/presentationml/2006/main" type="tx" showMasterSp="1" showMasterPhAnim="1">
+<p:sldLayout xmlns:a="http://schemas.openxmlformats.org/drawingml/2006/main" xmlns:r="http://schemas.openxmlformats.org/officeDocument/2006/relationships" xmlns:p="http://schemas.openxmlformats.org/presentationml/2006/main" type="tx">
   <p:cSld name="Title - Top">
     <p:spTree>
       <p:nvGrpSpPr>
@@ -943,7 +952,9 @@
       <p:sp>
         <p:nvSpPr>
           <p:cNvPr id="16" name="Shape 16"/>
-          <p:cNvSpPr/>
+          <p:cNvSpPr>
+            <a:spLocks noGrp="1"/>
+          </p:cNvSpPr>
           <p:nvPr>
             <p:ph type="title"/>
           </p:nvPr>
@@ -972,12 +983,12 @@
   <p:clrMapOvr>
     <a:masterClrMapping/>
   </p:clrMapOvr>
-  <p:transition spd="med" advClick="1"/>
+  <p:transition spd="med"/>
 </p:sldLayout>
 </file>
 
 <file path=ppt/slideLayouts/slideLayout6.xml><?xml version="1.0" encoding="utf-8"?>
-<p:sldLayout xmlns:a="http://schemas.openxmlformats.org/drawingml/2006/main" xmlns:r="http://schemas.openxmlformats.org/officeDocument/2006/relationships" xmlns:p="http://schemas.openxmlformats.org/presentationml/2006/main" type="tx" showMasterSp="1" showMasterPhAnim="1">
+<p:sldLayout xmlns:a="http://schemas.openxmlformats.org/drawingml/2006/main" xmlns:r="http://schemas.openxmlformats.org/officeDocument/2006/relationships" xmlns:p="http://schemas.openxmlformats.org/presentationml/2006/main" type="tx">
   <p:cSld name="Title &amp; Bullets">
     <p:spTree>
       <p:nvGrpSpPr>
@@ -996,7 +1007,9 @@
       <p:sp>
         <p:nvSpPr>
           <p:cNvPr id="18" name="Shape 18"/>
-          <p:cNvSpPr/>
+          <p:cNvSpPr>
+            <a:spLocks noGrp="1"/>
+          </p:cNvSpPr>
           <p:nvPr>
             <p:ph type="title"/>
           </p:nvPr>
@@ -1023,7 +1036,9 @@
       <p:sp>
         <p:nvSpPr>
           <p:cNvPr id="19" name="Shape 19"/>
-          <p:cNvSpPr/>
+          <p:cNvSpPr>
+            <a:spLocks noGrp="1"/>
+          </p:cNvSpPr>
           <p:nvPr>
             <p:ph type="body" idx="1"/>
           </p:nvPr>
@@ -1044,7 +1059,6 @@
               <a:rPr sz="3600"/>
               <a:t>Body Level One</a:t>
             </a:r>
-            <a:endParaRPr sz="3600"/>
           </a:p>
           <a:p>
             <a:pPr lvl="1">
@@ -1054,7 +1068,6 @@
               <a:rPr sz="3600"/>
               <a:t>Body Level Two</a:t>
             </a:r>
-            <a:endParaRPr sz="3600"/>
           </a:p>
           <a:p>
             <a:pPr lvl="2">
@@ -1064,7 +1077,6 @@
               <a:rPr sz="3600"/>
               <a:t>Body Level Three</a:t>
             </a:r>
-            <a:endParaRPr sz="3600"/>
           </a:p>
           <a:p>
             <a:pPr lvl="3">
@@ -1074,7 +1086,6 @@
               <a:rPr sz="3600"/>
               <a:t>Body Level Four</a:t>
             </a:r>
-            <a:endParaRPr sz="3600"/>
           </a:p>
           <a:p>
             <a:pPr lvl="4">
@@ -1092,12 +1103,12 @@
   <p:clrMapOvr>
     <a:masterClrMapping/>
   </p:clrMapOvr>
-  <p:transition spd="med" advClick="1"/>
+  <p:transition spd="med"/>
 </p:sldLayout>
 </file>
 
 <file path=ppt/slideLayouts/slideLayout7.xml><?xml version="1.0" encoding="utf-8"?>
-<p:sldLayout xmlns:a="http://schemas.openxmlformats.org/drawingml/2006/main" xmlns:r="http://schemas.openxmlformats.org/officeDocument/2006/relationships" xmlns:p="http://schemas.openxmlformats.org/presentationml/2006/main" type="tx" showMasterSp="1" showMasterPhAnim="1">
+<p:sldLayout xmlns:a="http://schemas.openxmlformats.org/drawingml/2006/main" xmlns:r="http://schemas.openxmlformats.org/officeDocument/2006/relationships" xmlns:p="http://schemas.openxmlformats.org/presentationml/2006/main" type="tx">
   <p:cSld name="Title, Bullets &amp; Photo">
     <p:spTree>
       <p:nvGrpSpPr>
@@ -1116,7 +1127,9 @@
       <p:sp>
         <p:nvSpPr>
           <p:cNvPr id="21" name="Shape 21"/>
-          <p:cNvSpPr/>
+          <p:cNvSpPr>
+            <a:spLocks noGrp="1"/>
+          </p:cNvSpPr>
           <p:nvPr>
             <p:ph type="title"/>
           </p:nvPr>
@@ -1143,7 +1156,9 @@
       <p:sp>
         <p:nvSpPr>
           <p:cNvPr id="22" name="Shape 22"/>
-          <p:cNvSpPr/>
+          <p:cNvSpPr>
+            <a:spLocks noGrp="1"/>
+          </p:cNvSpPr>
           <p:nvPr>
             <p:ph type="body" idx="1"/>
           </p:nvPr>
@@ -1199,7 +1214,6 @@
               <a:rPr sz="2800"/>
               <a:t>Body Level One</a:t>
             </a:r>
-            <a:endParaRPr sz="2800"/>
           </a:p>
           <a:p>
             <a:pPr lvl="1">
@@ -1209,7 +1223,6 @@
               <a:rPr sz="2800"/>
               <a:t>Body Level Two</a:t>
             </a:r>
-            <a:endParaRPr sz="2800"/>
           </a:p>
           <a:p>
             <a:pPr lvl="2">
@@ -1219,7 +1232,6 @@
               <a:rPr sz="2800"/>
               <a:t>Body Level Three</a:t>
             </a:r>
-            <a:endParaRPr sz="2800"/>
           </a:p>
           <a:p>
             <a:pPr lvl="3">
@@ -1229,7 +1241,6 @@
               <a:rPr sz="2800"/>
               <a:t>Body Level Four</a:t>
             </a:r>
-            <a:endParaRPr sz="2800"/>
           </a:p>
           <a:p>
             <a:pPr lvl="4">
@@ -1247,12 +1258,12 @@
   <p:clrMapOvr>
     <a:masterClrMapping/>
   </p:clrMapOvr>
-  <p:transition spd="med" advClick="1"/>
+  <p:transition spd="med"/>
 </p:sldLayout>
 </file>
 
 <file path=ppt/slideLayouts/slideLayout8.xml><?xml version="1.0" encoding="utf-8"?>
-<p:sldLayout xmlns:a="http://schemas.openxmlformats.org/drawingml/2006/main" xmlns:r="http://schemas.openxmlformats.org/officeDocument/2006/relationships" xmlns:p="http://schemas.openxmlformats.org/presentationml/2006/main" type="tx" showMasterSp="1" showMasterPhAnim="1">
+<p:sldLayout xmlns:a="http://schemas.openxmlformats.org/drawingml/2006/main" xmlns:r="http://schemas.openxmlformats.org/officeDocument/2006/relationships" xmlns:p="http://schemas.openxmlformats.org/presentationml/2006/main" type="tx">
   <p:cSld name="Bullets">
     <p:spTree>
       <p:nvGrpSpPr>
@@ -1271,7 +1282,9 @@
       <p:sp>
         <p:nvSpPr>
           <p:cNvPr id="24" name="Shape 24"/>
-          <p:cNvSpPr/>
+          <p:cNvSpPr>
+            <a:spLocks noGrp="1"/>
+          </p:cNvSpPr>
           <p:nvPr>
             <p:ph type="body" idx="1"/>
           </p:nvPr>
@@ -1296,7 +1309,6 @@
               <a:rPr sz="3600"/>
               <a:t>Body Level One</a:t>
             </a:r>
-            <a:endParaRPr sz="3600"/>
           </a:p>
           <a:p>
             <a:pPr lvl="1">
@@ -1306,7 +1318,6 @@
               <a:rPr sz="3600"/>
               <a:t>Body Level Two</a:t>
             </a:r>
-            <a:endParaRPr sz="3600"/>
           </a:p>
           <a:p>
             <a:pPr lvl="2">
@@ -1316,7 +1327,6 @@
               <a:rPr sz="3600"/>
               <a:t>Body Level Three</a:t>
             </a:r>
-            <a:endParaRPr sz="3600"/>
           </a:p>
           <a:p>
             <a:pPr lvl="3">
@@ -1326,7 +1336,6 @@
               <a:rPr sz="3600"/>
               <a:t>Body Level Four</a:t>
             </a:r>
-            <a:endParaRPr sz="3600"/>
           </a:p>
           <a:p>
             <a:pPr lvl="4">
@@ -1344,12 +1353,12 @@
   <p:clrMapOvr>
     <a:masterClrMapping/>
   </p:clrMapOvr>
-  <p:transition spd="med" advClick="1"/>
+  <p:transition spd="med"/>
 </p:sldLayout>
 </file>
 
 <file path=ppt/slideLayouts/slideLayout9.xml><?xml version="1.0" encoding="utf-8"?>
-<p:sldLayout xmlns:a="http://schemas.openxmlformats.org/drawingml/2006/main" xmlns:r="http://schemas.openxmlformats.org/officeDocument/2006/relationships" xmlns:p="http://schemas.openxmlformats.org/presentationml/2006/main" type="tx" showMasterSp="1" showMasterPhAnim="1">
+<p:sldLayout xmlns:a="http://schemas.openxmlformats.org/drawingml/2006/main" xmlns:r="http://schemas.openxmlformats.org/officeDocument/2006/relationships" xmlns:p="http://schemas.openxmlformats.org/presentationml/2006/main" type="tx">
   <p:cSld name="Photo - 3 Up">
     <p:spTree>
       <p:nvGrpSpPr>
@@ -1370,7 +1379,7 @@
   <p:clrMapOvr>
     <a:masterClrMapping/>
   </p:clrMapOvr>
-  <p:transition spd="med" advClick="1"/>
+  <p:transition spd="med"/>
 </p:sldLayout>
 </file>
 
@@ -1382,6 +1391,7 @@
         <a:solidFill>
           <a:srgbClr val="FFFFFF"/>
         </a:solidFill>
+        <a:effectLst/>
       </p:bgPr>
     </p:bg>
     <p:spTree>
@@ -1401,7 +1411,9 @@
       <p:sp>
         <p:nvSpPr>
           <p:cNvPr id="2" name="Shape 2"/>
-          <p:cNvSpPr/>
+          <p:cNvSpPr>
+            <a:spLocks noGrp="1"/>
+          </p:cNvSpPr>
           <p:nvPr>
             <p:ph type="title"/>
           </p:nvPr>
@@ -1419,13 +1431,13 @@
           </a:ln>
           <a:extLst>
             <a:ext uri="{C572A759-6A51-4108-AA02-DFA0A04FC94B}">
-              <ma14:wrappingTextBoxFlag xmlns:ma14="http://schemas.microsoft.com/office/mac/drawingml/2011/main" val="1"/>
+              <ma14:wrappingTextBoxFlag xmlns:ma14="http://schemas.microsoft.com/office/mac/drawingml/2011/main" xmlns="" val="1"/>
             </a:ext>
           </a:extLst>
         </p:spPr>
         <p:txBody>
           <a:bodyPr lIns="0" tIns="0" rIns="0" bIns="0" anchor="ctr">
-            <a:normAutofit fontScale="100000" lnSpcReduction="0"/>
+            <a:normAutofit/>
           </a:bodyPr>
           <a:lstStyle/>
           <a:p>
@@ -1442,7 +1454,9 @@
       <p:sp>
         <p:nvSpPr>
           <p:cNvPr id="3" name="Shape 3"/>
-          <p:cNvSpPr/>
+          <p:cNvSpPr>
+            <a:spLocks noGrp="1"/>
+          </p:cNvSpPr>
           <p:nvPr>
             <p:ph type="body" idx="1"/>
           </p:nvPr>
@@ -1460,13 +1474,13 @@
           </a:ln>
           <a:extLst>
             <a:ext uri="{C572A759-6A51-4108-AA02-DFA0A04FC94B}">
-              <ma14:wrappingTextBoxFlag xmlns:ma14="http://schemas.microsoft.com/office/mac/drawingml/2011/main" val="1"/>
+              <ma14:wrappingTextBoxFlag xmlns:ma14="http://schemas.microsoft.com/office/mac/drawingml/2011/main" xmlns="" val="1"/>
             </a:ext>
           </a:extLst>
         </p:spPr>
         <p:txBody>
           <a:bodyPr lIns="0" tIns="0" rIns="0" bIns="0" anchor="ctr">
-            <a:normAutofit fontScale="100000" lnSpcReduction="0"/>
+            <a:normAutofit/>
           </a:bodyPr>
           <a:lstStyle/>
           <a:p>
@@ -1477,7 +1491,6 @@
               <a:rPr sz="3600"/>
               <a:t>Body Level One</a:t>
             </a:r>
-            <a:endParaRPr sz="3600"/>
           </a:p>
           <a:p>
             <a:pPr lvl="1">
@@ -1487,7 +1500,6 @@
               <a:rPr sz="3600"/>
               <a:t>Body Level Two</a:t>
             </a:r>
-            <a:endParaRPr sz="3600"/>
           </a:p>
           <a:p>
             <a:pPr lvl="2">
@@ -1497,7 +1509,6 @@
               <a:rPr sz="3600"/>
               <a:t>Body Level Three</a:t>
             </a:r>
-            <a:endParaRPr sz="3600"/>
           </a:p>
           <a:p>
             <a:pPr lvl="3">
@@ -1507,7 +1518,6 @@
               <a:rPr sz="3600"/>
               <a:t>Body Level Four</a:t>
             </a:r>
-            <a:endParaRPr sz="3600"/>
           </a:p>
           <a:p>
             <a:pPr lvl="4">
@@ -1524,20 +1534,20 @@
   </p:cSld>
   <p:clrMap bg1="lt1" tx1="dk1" bg2="lt2" tx2="dk2" accent1="accent1" accent2="accent2" accent3="accent3" accent4="accent4" accent5="accent5" accent6="accent6" hlink="hlink" folHlink="folHlink"/>
   <p:sldLayoutIdLst>
-    <p:sldLayoutId id="2147483649" r:id="rId2"/>
-    <p:sldLayoutId id="2147483650" r:id="rId3"/>
-    <p:sldLayoutId id="2147483651" r:id="rId4"/>
-    <p:sldLayoutId id="2147483652" r:id="rId5"/>
-    <p:sldLayoutId id="2147483653" r:id="rId6"/>
-    <p:sldLayoutId id="2147483654" r:id="rId7"/>
-    <p:sldLayoutId id="2147483655" r:id="rId8"/>
-    <p:sldLayoutId id="2147483656" r:id="rId9"/>
-    <p:sldLayoutId id="2147483657" r:id="rId10"/>
-    <p:sldLayoutId id="2147483658" r:id="rId11"/>
-    <p:sldLayoutId id="2147483659" r:id="rId12"/>
-    <p:sldLayoutId id="2147483660" r:id="rId13"/>
+    <p:sldLayoutId id="2147483649" r:id="rId1"/>
+    <p:sldLayoutId id="2147483650" r:id="rId2"/>
+    <p:sldLayoutId id="2147483651" r:id="rId3"/>
+    <p:sldLayoutId id="2147483652" r:id="rId4"/>
+    <p:sldLayoutId id="2147483653" r:id="rId5"/>
+    <p:sldLayoutId id="2147483654" r:id="rId6"/>
+    <p:sldLayoutId id="2147483655" r:id="rId7"/>
+    <p:sldLayoutId id="2147483656" r:id="rId8"/>
+    <p:sldLayoutId id="2147483657" r:id="rId9"/>
+    <p:sldLayoutId id="2147483658" r:id="rId10"/>
+    <p:sldLayoutId id="2147483659" r:id="rId11"/>
+    <p:sldLayoutId id="2147483660" r:id="rId12"/>
   </p:sldLayoutIdLst>
-  <p:transition spd="med" advClick="1"/>
+  <p:transition spd="med"/>
   <p:txStyles>
     <p:titleStyle>
       <a:lvl1pPr algn="ctr" defTabSz="584200">
@@ -1838,7 +1848,7 @@
 </file>
 
 <file path=ppt/slides/slide1.xml><?xml version="1.0" encoding="utf-8"?>
-<p:sld xmlns:a="http://schemas.openxmlformats.org/drawingml/2006/main" xmlns:r="http://schemas.openxmlformats.org/officeDocument/2006/relationships" xmlns:p="http://schemas.openxmlformats.org/presentationml/2006/main" showMasterSp="1" showMasterPhAnim="1">
+<p:sld xmlns:a="http://schemas.openxmlformats.org/drawingml/2006/main" xmlns:r="http://schemas.openxmlformats.org/officeDocument/2006/relationships" xmlns:p="http://schemas.openxmlformats.org/presentationml/2006/main">
   <p:cSld>
     <p:spTree>
       <p:nvGrpSpPr>
@@ -1857,7 +1867,9 @@
       <p:sp>
         <p:nvSpPr>
           <p:cNvPr id="32" name="Shape 32"/>
-          <p:cNvSpPr/>
+          <p:cNvSpPr>
+            <a:spLocks noGrp="1"/>
+          </p:cNvSpPr>
           <p:nvPr>
             <p:ph type="title"/>
           </p:nvPr>
@@ -1886,12 +1898,12 @@
   <p:clrMapOvr>
     <a:masterClrMapping/>
   </p:clrMapOvr>
-  <p:transition spd="med" advClick="1"/>
+  <p:transition spd="med"/>
 </p:sld>
 </file>
 
 <file path=ppt/slides/slide10.xml><?xml version="1.0" encoding="utf-8"?>
-<p:sld xmlns:a="http://schemas.openxmlformats.org/drawingml/2006/main" xmlns:r="http://schemas.openxmlformats.org/officeDocument/2006/relationships" xmlns:p="http://schemas.openxmlformats.org/presentationml/2006/main" showMasterSp="1" showMasterPhAnim="1">
+<p:sld xmlns:a="http://schemas.openxmlformats.org/drawingml/2006/main" xmlns:r="http://schemas.openxmlformats.org/officeDocument/2006/relationships" xmlns:p="http://schemas.openxmlformats.org/presentationml/2006/main">
   <p:cSld>
     <p:spTree>
       <p:nvGrpSpPr>
@@ -1910,7 +1922,9 @@
       <p:sp>
         <p:nvSpPr>
           <p:cNvPr id="59" name="Shape 59"/>
-          <p:cNvSpPr/>
+          <p:cNvSpPr>
+            <a:spLocks noGrp="1"/>
+          </p:cNvSpPr>
           <p:nvPr>
             <p:ph type="title"/>
           </p:nvPr>
@@ -1937,7 +1951,9 @@
       <p:sp>
         <p:nvSpPr>
           <p:cNvPr id="60" name="Shape 60"/>
-          <p:cNvSpPr/>
+          <p:cNvSpPr>
+            <a:spLocks noGrp="1"/>
+          </p:cNvSpPr>
           <p:nvPr>
             <p:ph type="body" idx="1"/>
           </p:nvPr>
@@ -1958,7 +1974,6 @@
               <a:rPr sz="3600"/>
               <a:t>SQL</a:t>
             </a:r>
-            <a:endParaRPr sz="3600"/>
           </a:p>
           <a:p>
             <a:pPr lvl="0">
@@ -1968,7 +1983,6 @@
               <a:rPr sz="3600"/>
               <a:t>Caching</a:t>
             </a:r>
-            <a:endParaRPr sz="3600"/>
           </a:p>
           <a:p>
             <a:pPr lvl="0">
@@ -1978,7 +1992,6 @@
               <a:rPr sz="3600"/>
               <a:t>State</a:t>
             </a:r>
-            <a:endParaRPr sz="3600"/>
           </a:p>
           <a:p>
             <a:pPr lvl="0">
@@ -1988,7 +2001,6 @@
               <a:rPr sz="3600"/>
               <a:t>Monolith approaches</a:t>
             </a:r>
-            <a:endParaRPr sz="3600"/>
           </a:p>
           <a:p>
             <a:pPr lvl="0">
@@ -1998,7 +2010,6 @@
               <a:rPr sz="3600"/>
               <a:t>Content</a:t>
             </a:r>
-            <a:endParaRPr sz="3600"/>
           </a:p>
           <a:p>
             <a:pPr lvl="0">
@@ -2016,12 +2027,12 @@
   <p:clrMapOvr>
     <a:masterClrMapping/>
   </p:clrMapOvr>
-  <p:transition spd="med" advClick="1"/>
+  <p:transition spd="med"/>
 </p:sld>
 </file>
 
 <file path=ppt/slides/slide11.xml><?xml version="1.0" encoding="utf-8"?>
-<p:sld xmlns:a="http://schemas.openxmlformats.org/drawingml/2006/main" xmlns:r="http://schemas.openxmlformats.org/officeDocument/2006/relationships" xmlns:p="http://schemas.openxmlformats.org/presentationml/2006/main" showMasterSp="1" showMasterPhAnim="1">
+<p:sld xmlns:a="http://schemas.openxmlformats.org/drawingml/2006/main" xmlns:r="http://schemas.openxmlformats.org/officeDocument/2006/relationships" xmlns:p="http://schemas.openxmlformats.org/presentationml/2006/main">
   <p:cSld>
     <p:spTree>
       <p:nvGrpSpPr>
@@ -2040,7 +2051,9 @@
       <p:sp>
         <p:nvSpPr>
           <p:cNvPr id="62" name="Shape 62"/>
-          <p:cNvSpPr/>
+          <p:cNvSpPr>
+            <a:spLocks noGrp="1"/>
+          </p:cNvSpPr>
           <p:nvPr>
             <p:ph type="title"/>
           </p:nvPr>
@@ -2071,7 +2084,9 @@
       <p:sp>
         <p:nvSpPr>
           <p:cNvPr id="63" name="Shape 63"/>
-          <p:cNvSpPr/>
+          <p:cNvSpPr>
+            <a:spLocks noGrp="1"/>
+          </p:cNvSpPr>
           <p:nvPr>
             <p:ph type="body" idx="1"/>
           </p:nvPr>
@@ -2092,7 +2107,6 @@
               <a:rPr sz="3600"/>
               <a:t>Subscription models</a:t>
             </a:r>
-            <a:endParaRPr sz="3600"/>
           </a:p>
           <a:p>
             <a:pPr lvl="0">
@@ -2102,7 +2116,6 @@
               <a:rPr sz="3600"/>
               <a:t>Distributed architecture</a:t>
             </a:r>
-            <a:endParaRPr sz="3600"/>
           </a:p>
           <a:p>
             <a:pPr lvl="0">
@@ -2112,7 +2125,6 @@
               <a:rPr sz="3600"/>
               <a:t>Proxies</a:t>
             </a:r>
-            <a:endParaRPr sz="3600"/>
           </a:p>
           <a:p>
             <a:pPr lvl="0">
@@ -2130,12 +2142,12 @@
   <p:clrMapOvr>
     <a:masterClrMapping/>
   </p:clrMapOvr>
-  <p:transition spd="med" advClick="1"/>
+  <p:transition spd="med"/>
 </p:sld>
 </file>
 
 <file path=ppt/slides/slide2.xml><?xml version="1.0" encoding="utf-8"?>
-<p:sld xmlns:a="http://schemas.openxmlformats.org/drawingml/2006/main" xmlns:r="http://schemas.openxmlformats.org/officeDocument/2006/relationships" xmlns:p="http://schemas.openxmlformats.org/presentationml/2006/main" showMasterSp="1" showMasterPhAnim="1">
+<p:sld xmlns:a="http://schemas.openxmlformats.org/drawingml/2006/main" xmlns:r="http://schemas.openxmlformats.org/officeDocument/2006/relationships" xmlns:p="http://schemas.openxmlformats.org/presentationml/2006/main">
   <p:cSld>
     <p:spTree>
       <p:nvGrpSpPr>
@@ -2154,7 +2166,9 @@
       <p:sp>
         <p:nvSpPr>
           <p:cNvPr id="34" name="Shape 34"/>
-          <p:cNvSpPr/>
+          <p:cNvSpPr>
+            <a:spLocks noGrp="1"/>
+          </p:cNvSpPr>
           <p:nvPr>
             <p:ph type="title"/>
           </p:nvPr>
@@ -2181,7 +2195,9 @@
       <p:sp>
         <p:nvSpPr>
           <p:cNvPr id="35" name="Shape 35"/>
-          <p:cNvSpPr/>
+          <p:cNvSpPr>
+            <a:spLocks noGrp="1"/>
+          </p:cNvSpPr>
           <p:nvPr>
             <p:ph type="body" idx="1"/>
           </p:nvPr>
@@ -2202,7 +2218,6 @@
               <a:rPr sz="3600"/>
               <a:t>Client Server Runtime Framework</a:t>
             </a:r>
-            <a:endParaRPr sz="3600"/>
           </a:p>
           <a:p>
             <a:pPr lvl="0">
@@ -2212,7 +2227,6 @@
               <a:rPr sz="3600"/>
               <a:t>Open Source</a:t>
             </a:r>
-            <a:endParaRPr sz="3600"/>
           </a:p>
           <a:p>
             <a:pPr lvl="0">
@@ -2222,7 +2236,6 @@
               <a:rPr sz="3600"/>
               <a:t>Free</a:t>
             </a:r>
-            <a:endParaRPr sz="3600"/>
           </a:p>
           <a:p>
             <a:pPr lvl="0">
@@ -2240,12 +2253,12 @@
   <p:clrMapOvr>
     <a:masterClrMapping/>
   </p:clrMapOvr>
-  <p:transition spd="med" advClick="1"/>
+  <p:transition spd="med"/>
 </p:sld>
 </file>
 
 <file path=ppt/slides/slide3.xml><?xml version="1.0" encoding="utf-8"?>
-<p:sld xmlns:a="http://schemas.openxmlformats.org/drawingml/2006/main" xmlns:r="http://schemas.openxmlformats.org/officeDocument/2006/relationships" xmlns:p="http://schemas.openxmlformats.org/presentationml/2006/main" showMasterSp="1" showMasterPhAnim="1">
+<p:sld xmlns:a="http://schemas.openxmlformats.org/drawingml/2006/main" xmlns:r="http://schemas.openxmlformats.org/officeDocument/2006/relationships" xmlns:p="http://schemas.openxmlformats.org/presentationml/2006/main">
   <p:cSld>
     <p:spTree>
       <p:nvGrpSpPr>
@@ -2264,7 +2277,9 @@
       <p:sp>
         <p:nvSpPr>
           <p:cNvPr id="37" name="Shape 37"/>
-          <p:cNvSpPr/>
+          <p:cNvSpPr>
+            <a:spLocks noGrp="1"/>
+          </p:cNvSpPr>
           <p:nvPr>
             <p:ph type="title"/>
           </p:nvPr>
@@ -2291,7 +2306,9 @@
       <p:sp>
         <p:nvSpPr>
           <p:cNvPr id="38" name="Shape 38"/>
-          <p:cNvSpPr/>
+          <p:cNvSpPr>
+            <a:spLocks noGrp="1"/>
+          </p:cNvSpPr>
           <p:nvPr>
             <p:ph type="body" idx="1"/>
           </p:nvPr>
@@ -2305,7 +2322,7 @@
           <a:bodyPr/>
           <a:lstStyle/>
           <a:p>
-            <a:pPr lvl="0" marL="422275" indent="-422275" defTabSz="554990">
+            <a:pPr marL="422275" lvl="0" indent="-422275" defTabSz="554990">
               <a:spcBef>
                 <a:spcPts val="3900"/>
               </a:spcBef>
@@ -2315,10 +2332,9 @@
               <a:rPr sz="3420"/>
               <a:t>Built on Chromiums V8 JavaScript Engine which is also open source</a:t>
             </a:r>
-            <a:endParaRPr sz="3420"/>
-          </a:p>
-          <a:p>
-            <a:pPr lvl="0" marL="422275" indent="-422275" defTabSz="554990">
+          </a:p>
+          <a:p>
+            <a:pPr marL="422275" lvl="0" indent="-422275" defTabSz="554990">
               <a:spcBef>
                 <a:spcPts val="3900"/>
               </a:spcBef>
@@ -2328,10 +2344,9 @@
               <a:rPr sz="3420"/>
               <a:t>V8 is written in C++</a:t>
             </a:r>
-            <a:endParaRPr sz="3420"/>
-          </a:p>
-          <a:p>
-            <a:pPr lvl="0" marL="422275" indent="-422275" defTabSz="554990">
+          </a:p>
+          <a:p>
+            <a:pPr marL="422275" lvl="0" indent="-422275" defTabSz="554990">
               <a:spcBef>
                 <a:spcPts val="3900"/>
               </a:spcBef>
@@ -2341,10 +2356,9 @@
               <a:rPr sz="3420"/>
               <a:t>Runtime is single threaded and I/O is non blocking </a:t>
             </a:r>
-            <a:endParaRPr sz="3420"/>
-          </a:p>
-          <a:p>
-            <a:pPr lvl="0" marL="422275" indent="-422275" defTabSz="554990">
+          </a:p>
+          <a:p>
+            <a:pPr marL="422275" lvl="0" indent="-422275" defTabSz="554990">
               <a:spcBef>
                 <a:spcPts val="3900"/>
               </a:spcBef>
@@ -2354,10 +2368,9 @@
               <a:rPr sz="3420"/>
               <a:t>Important: your code is not non blocking</a:t>
             </a:r>
-            <a:endParaRPr sz="3420"/>
-          </a:p>
-          <a:p>
-            <a:pPr lvl="0" marL="422275" indent="-422275" defTabSz="554990">
+          </a:p>
+          <a:p>
+            <a:pPr marL="422275" lvl="0" indent="-422275" defTabSz="554990">
               <a:spcBef>
                 <a:spcPts val="3900"/>
               </a:spcBef>
@@ -2367,10 +2380,9 @@
               <a:rPr sz="3420"/>
               <a:t>Event driven approach </a:t>
             </a:r>
-            <a:endParaRPr sz="3420"/>
-          </a:p>
-          <a:p>
-            <a:pPr lvl="0" marL="422275" indent="-422275" defTabSz="554990">
+          </a:p>
+          <a:p>
+            <a:pPr marL="422275" lvl="0" indent="-422275" defTabSz="554990">
               <a:spcBef>
                 <a:spcPts val="3900"/>
               </a:spcBef>
@@ -2388,12 +2400,12 @@
   <p:clrMapOvr>
     <a:masterClrMapping/>
   </p:clrMapOvr>
-  <p:transition spd="med" advClick="1"/>
+  <p:transition spd="med"/>
 </p:sld>
 </file>
 
 <file path=ppt/slides/slide4.xml><?xml version="1.0" encoding="utf-8"?>
-<p:sld xmlns:a="http://schemas.openxmlformats.org/drawingml/2006/main" xmlns:r="http://schemas.openxmlformats.org/officeDocument/2006/relationships" xmlns:p="http://schemas.openxmlformats.org/presentationml/2006/main" showMasterSp="1" showMasterPhAnim="1">
+<p:sld xmlns:a="http://schemas.openxmlformats.org/drawingml/2006/main" xmlns:r="http://schemas.openxmlformats.org/officeDocument/2006/relationships" xmlns:p="http://schemas.openxmlformats.org/presentationml/2006/main">
   <p:cSld>
     <p:spTree>
       <p:nvGrpSpPr>
@@ -2412,7 +2424,9 @@
       <p:sp>
         <p:nvSpPr>
           <p:cNvPr id="40" name="Shape 40"/>
-          <p:cNvSpPr/>
+          <p:cNvSpPr>
+            <a:spLocks noGrp="1"/>
+          </p:cNvSpPr>
           <p:nvPr>
             <p:ph type="title"/>
           </p:nvPr>
@@ -2439,7 +2453,9 @@
       <p:sp>
         <p:nvSpPr>
           <p:cNvPr id="41" name="Shape 41"/>
-          <p:cNvSpPr/>
+          <p:cNvSpPr>
+            <a:spLocks noGrp="1"/>
+          </p:cNvSpPr>
           <p:nvPr>
             <p:ph type="body" idx="1"/>
           </p:nvPr>
@@ -2460,7 +2476,6 @@
               <a:rPr sz="3600"/>
               <a:t>Out of the box NodeJS is barebones apart from the runtime</a:t>
             </a:r>
-            <a:endParaRPr sz="3600"/>
           </a:p>
           <a:p>
             <a:pPr lvl="0">
@@ -2470,7 +2485,6 @@
               <a:rPr sz="3600"/>
               <a:t>Common features are not included such as Gzip or Web Sockets </a:t>
             </a:r>
-            <a:endParaRPr sz="3600"/>
           </a:p>
           <a:p>
             <a:pPr lvl="0">
@@ -2480,7 +2494,6 @@
               <a:rPr sz="3600"/>
               <a:t>NodeJS has a package manager similar to Nuget, brew or gems: NPM</a:t>
             </a:r>
-            <a:endParaRPr sz="3600"/>
           </a:p>
           <a:p>
             <a:pPr lvl="0">
@@ -2498,12 +2511,12 @@
   <p:clrMapOvr>
     <a:masterClrMapping/>
   </p:clrMapOvr>
-  <p:transition spd="med" advClick="1"/>
+  <p:transition spd="med"/>
 </p:sld>
 </file>
 
 <file path=ppt/slides/slide5.xml><?xml version="1.0" encoding="utf-8"?>
-<p:sld xmlns:a="http://schemas.openxmlformats.org/drawingml/2006/main" xmlns:r="http://schemas.openxmlformats.org/officeDocument/2006/relationships" xmlns:p="http://schemas.openxmlformats.org/presentationml/2006/main" showMasterSp="1" showMasterPhAnim="1">
+<p:sld xmlns:a="http://schemas.openxmlformats.org/drawingml/2006/main" xmlns:r="http://schemas.openxmlformats.org/officeDocument/2006/relationships" xmlns:p="http://schemas.openxmlformats.org/presentationml/2006/main">
   <p:cSld>
     <p:spTree>
       <p:nvGrpSpPr>
@@ -2522,7 +2535,9 @@
       <p:sp>
         <p:nvSpPr>
           <p:cNvPr id="43" name="Shape 43"/>
-          <p:cNvSpPr/>
+          <p:cNvSpPr>
+            <a:spLocks noGrp="1"/>
+          </p:cNvSpPr>
           <p:nvPr>
             <p:ph type="title"/>
           </p:nvPr>
@@ -2549,7 +2564,9 @@
       <p:sp>
         <p:nvSpPr>
           <p:cNvPr id="44" name="Shape 44"/>
-          <p:cNvSpPr/>
+          <p:cNvSpPr>
+            <a:spLocks noGrp="1"/>
+          </p:cNvSpPr>
           <p:nvPr>
             <p:ph type="body" idx="1"/>
           </p:nvPr>
@@ -2572,7 +2589,7 @@
             </a:r>
             <a:r>
               <a:rPr sz="3600" u="sng">
-                <a:hlinkClick r:id="rId2" invalidUrl="" action="" tgtFrame="" tooltip="" history="1" highlightClick="0" endSnd="0"/>
+                <a:hlinkClick r:id="rId2"/>
               </a:rPr>
               <a:t>https://nodejs.org/en/download/</a:t>
             </a:r>
@@ -2580,7 +2597,6 @@
               <a:rPr sz="3600"/>
               <a:t> or from apt-get</a:t>
             </a:r>
-            <a:endParaRPr sz="3600"/>
           </a:p>
           <a:p>
             <a:pPr lvl="0">
@@ -2590,7 +2606,6 @@
               <a:rPr sz="3600"/>
               <a:t>NodeJS will install NPM with it</a:t>
             </a:r>
-            <a:endParaRPr sz="3600"/>
           </a:p>
           <a:p>
             <a:pPr lvl="0">
@@ -2608,12 +2623,12 @@
   <p:clrMapOvr>
     <a:masterClrMapping/>
   </p:clrMapOvr>
-  <p:transition spd="med" advClick="1"/>
+  <p:transition spd="med"/>
 </p:sld>
 </file>
 
 <file path=ppt/slides/slide6.xml><?xml version="1.0" encoding="utf-8"?>
-<p:sld xmlns:a="http://schemas.openxmlformats.org/drawingml/2006/main" xmlns:r="http://schemas.openxmlformats.org/officeDocument/2006/relationships" xmlns:p="http://schemas.openxmlformats.org/presentationml/2006/main" showMasterSp="1" showMasterPhAnim="1">
+<p:sld xmlns:a="http://schemas.openxmlformats.org/drawingml/2006/main" xmlns:r="http://schemas.openxmlformats.org/officeDocument/2006/relationships" xmlns:p="http://schemas.openxmlformats.org/presentationml/2006/main">
   <p:cSld>
     <p:spTree>
       <p:nvGrpSpPr>
@@ -2632,7 +2647,9 @@
       <p:sp>
         <p:nvSpPr>
           <p:cNvPr id="46" name="Shape 46"/>
-          <p:cNvSpPr/>
+          <p:cNvSpPr>
+            <a:spLocks noGrp="1"/>
+          </p:cNvSpPr>
           <p:nvPr>
             <p:ph type="title"/>
           </p:nvPr>
@@ -2659,7 +2676,9 @@
       <p:sp>
         <p:nvSpPr>
           <p:cNvPr id="47" name="Shape 47"/>
-          <p:cNvSpPr/>
+          <p:cNvSpPr>
+            <a:spLocks noGrp="1"/>
+          </p:cNvSpPr>
           <p:nvPr>
             <p:ph type="body" idx="1"/>
           </p:nvPr>
@@ -2680,7 +2699,6 @@
               <a:rPr sz="3600"/>
               <a:t>Source: console.log('hello world’);</a:t>
             </a:r>
-            <a:endParaRPr sz="3600"/>
           </a:p>
           <a:p>
             <a:pPr lvl="0">
@@ -2690,7 +2708,6 @@
               <a:rPr sz="3600"/>
               <a:t>To execute: node “1. Hello World.js”</a:t>
             </a:r>
-            <a:endParaRPr sz="3600"/>
           </a:p>
           <a:p>
             <a:pPr lvl="0">
@@ -2708,12 +2725,12 @@
   <p:clrMapOvr>
     <a:masterClrMapping/>
   </p:clrMapOvr>
-  <p:transition spd="med" advClick="1"/>
+  <p:transition spd="med"/>
 </p:sld>
 </file>
 
 <file path=ppt/slides/slide7.xml><?xml version="1.0" encoding="utf-8"?>
-<p:sld xmlns:a="http://schemas.openxmlformats.org/drawingml/2006/main" xmlns:r="http://schemas.openxmlformats.org/officeDocument/2006/relationships" xmlns:p="http://schemas.openxmlformats.org/presentationml/2006/main" showMasterSp="1" showMasterPhAnim="1">
+<p:sld xmlns:a="http://schemas.openxmlformats.org/drawingml/2006/main" xmlns:r="http://schemas.openxmlformats.org/officeDocument/2006/relationships" xmlns:p="http://schemas.openxmlformats.org/presentationml/2006/main">
   <p:cSld>
     <p:spTree>
       <p:nvGrpSpPr>
@@ -2732,7 +2749,9 @@
       <p:sp>
         <p:nvSpPr>
           <p:cNvPr id="49" name="Shape 49"/>
-          <p:cNvSpPr/>
+          <p:cNvSpPr>
+            <a:spLocks noGrp="1"/>
+          </p:cNvSpPr>
           <p:nvPr>
             <p:ph type="title"/>
           </p:nvPr>
@@ -2759,7 +2778,9 @@
       <p:sp>
         <p:nvSpPr>
           <p:cNvPr id="50" name="Shape 50"/>
-          <p:cNvSpPr/>
+          <p:cNvSpPr>
+            <a:spLocks noGrp="1"/>
+          </p:cNvSpPr>
           <p:nvPr>
             <p:ph type="body" idx="1"/>
           </p:nvPr>
@@ -2773,7 +2794,7 @@
           <a:bodyPr/>
           <a:lstStyle/>
           <a:p>
-            <a:pPr lvl="3" marL="0" indent="685800" defTabSz="457200">
+            <a:pPr marL="0" lvl="3" indent="685800" defTabSz="457200">
               <a:spcBef>
                 <a:spcPts val="0"/>
               </a:spcBef>
@@ -2804,15 +2825,9 @@
               </a:rPr>
               <a:t>var http = require('http');</a:t>
             </a:r>
-            <a:endParaRPr sz="1600">
-              <a:latin typeface="Helvetica"/>
-              <a:ea typeface="Helvetica"/>
-              <a:cs typeface="Helvetica"/>
-              <a:sym typeface="Helvetica"/>
-            </a:endParaRPr>
-          </a:p>
-          <a:p>
-            <a:pPr lvl="3" marL="0" indent="685800" defTabSz="457200">
+          </a:p>
+          <a:p>
+            <a:pPr marL="0" lvl="3" indent="685800" defTabSz="457200">
               <a:spcBef>
                 <a:spcPts val="0"/>
               </a:spcBef>
@@ -2843,15 +2858,9 @@
               </a:rPr>
               <a:t>var options = {</a:t>
             </a:r>
-            <a:endParaRPr sz="1600">
-              <a:latin typeface="Helvetica"/>
-              <a:ea typeface="Helvetica"/>
-              <a:cs typeface="Helvetica"/>
-              <a:sym typeface="Helvetica"/>
-            </a:endParaRPr>
-          </a:p>
-          <a:p>
-            <a:pPr lvl="3" marL="0" indent="685800" defTabSz="457200">
+          </a:p>
+          <a:p>
+            <a:pPr marL="0" lvl="3" indent="685800" defTabSz="457200">
               <a:spcBef>
                 <a:spcPts val="0"/>
               </a:spcBef>
@@ -2882,15 +2891,9 @@
               </a:rPr>
               <a:t>  host: 'www.google.com',</a:t>
             </a:r>
-            <a:endParaRPr sz="1600">
-              <a:latin typeface="Helvetica"/>
-              <a:ea typeface="Helvetica"/>
-              <a:cs typeface="Helvetica"/>
-              <a:sym typeface="Helvetica"/>
-            </a:endParaRPr>
-          </a:p>
-          <a:p>
-            <a:pPr lvl="3" marL="0" indent="685800" defTabSz="457200">
+          </a:p>
+          <a:p>
+            <a:pPr marL="0" lvl="3" indent="685800" defTabSz="457200">
               <a:spcBef>
                 <a:spcPts val="0"/>
               </a:spcBef>
@@ -2921,15 +2924,9 @@
               </a:rPr>
               <a:t>  path: ''</a:t>
             </a:r>
-            <a:endParaRPr sz="1600">
-              <a:latin typeface="Helvetica"/>
-              <a:ea typeface="Helvetica"/>
-              <a:cs typeface="Helvetica"/>
-              <a:sym typeface="Helvetica"/>
-            </a:endParaRPr>
-          </a:p>
-          <a:p>
-            <a:pPr lvl="3" marL="0" indent="685800" defTabSz="457200">
+          </a:p>
+          <a:p>
+            <a:pPr marL="0" lvl="3" indent="685800" defTabSz="457200">
               <a:spcBef>
                 <a:spcPts val="0"/>
               </a:spcBef>
@@ -2960,15 +2957,9 @@
               </a:rPr>
               <a:t>};</a:t>
             </a:r>
-            <a:endParaRPr sz="1600">
-              <a:latin typeface="Helvetica"/>
-              <a:ea typeface="Helvetica"/>
-              <a:cs typeface="Helvetica"/>
-              <a:sym typeface="Helvetica"/>
-            </a:endParaRPr>
-          </a:p>
-          <a:p>
-            <a:pPr lvl="3" marL="0" indent="685800" defTabSz="457200">
+          </a:p>
+          <a:p>
+            <a:pPr marL="0" lvl="3" indent="685800" defTabSz="457200">
               <a:spcBef>
                 <a:spcPts val="0"/>
               </a:spcBef>
@@ -2999,15 +2990,9 @@
               </a:rPr>
               <a:t>var callback = function(response) {</a:t>
             </a:r>
-            <a:endParaRPr sz="1600">
-              <a:latin typeface="Helvetica"/>
-              <a:ea typeface="Helvetica"/>
-              <a:cs typeface="Helvetica"/>
-              <a:sym typeface="Helvetica"/>
-            </a:endParaRPr>
-          </a:p>
-          <a:p>
-            <a:pPr lvl="3" marL="0" indent="685800" defTabSz="457200">
+          </a:p>
+          <a:p>
+            <a:pPr marL="0" lvl="3" indent="685800" defTabSz="457200">
               <a:spcBef>
                 <a:spcPts val="0"/>
               </a:spcBef>
@@ -3038,15 +3023,9 @@
               </a:rPr>
               <a:t>  var str = '';</a:t>
             </a:r>
-            <a:endParaRPr sz="1600">
-              <a:latin typeface="Helvetica"/>
-              <a:ea typeface="Helvetica"/>
-              <a:cs typeface="Helvetica"/>
-              <a:sym typeface="Helvetica"/>
-            </a:endParaRPr>
-          </a:p>
-          <a:p>
-            <a:pPr lvl="3" marL="0" indent="685800" defTabSz="457200">
+          </a:p>
+          <a:p>
+            <a:pPr marL="0" lvl="3" indent="685800" defTabSz="457200">
               <a:spcBef>
                 <a:spcPts val="0"/>
               </a:spcBef>
@@ -3076,7 +3055,7 @@
             </a:endParaRPr>
           </a:p>
           <a:p>
-            <a:pPr lvl="3" marL="0" indent="685800" defTabSz="457200">
+            <a:pPr marL="0" lvl="3" indent="685800" defTabSz="457200">
               <a:spcBef>
                 <a:spcPts val="0"/>
               </a:spcBef>
@@ -3107,15 +3086,9 @@
               </a:rPr>
               <a:t>  //data is gotten in chunks</a:t>
             </a:r>
-            <a:endParaRPr sz="1600">
-              <a:latin typeface="Helvetica"/>
-              <a:ea typeface="Helvetica"/>
-              <a:cs typeface="Helvetica"/>
-              <a:sym typeface="Helvetica"/>
-            </a:endParaRPr>
-          </a:p>
-          <a:p>
-            <a:pPr lvl="3" marL="0" indent="685800" defTabSz="457200">
+          </a:p>
+          <a:p>
+            <a:pPr marL="0" lvl="3" indent="685800" defTabSz="457200">
               <a:spcBef>
                 <a:spcPts val="0"/>
               </a:spcBef>
@@ -3146,15 +3119,9 @@
               </a:rPr>
               <a:t>  response.on('data', function (chunk) {</a:t>
             </a:r>
-            <a:endParaRPr sz="1600">
-              <a:latin typeface="Helvetica"/>
-              <a:ea typeface="Helvetica"/>
-              <a:cs typeface="Helvetica"/>
-              <a:sym typeface="Helvetica"/>
-            </a:endParaRPr>
-          </a:p>
-          <a:p>
-            <a:pPr lvl="3" marL="0" indent="685800" defTabSz="457200">
+          </a:p>
+          <a:p>
+            <a:pPr marL="0" lvl="3" indent="685800" defTabSz="457200">
               <a:spcBef>
                 <a:spcPts val="0"/>
               </a:spcBef>
@@ -3185,15 +3152,9 @@
               </a:rPr>
               <a:t>    str += chunk;</a:t>
             </a:r>
-            <a:endParaRPr sz="1600">
-              <a:latin typeface="Helvetica"/>
-              <a:ea typeface="Helvetica"/>
-              <a:cs typeface="Helvetica"/>
-              <a:sym typeface="Helvetica"/>
-            </a:endParaRPr>
-          </a:p>
-          <a:p>
-            <a:pPr lvl="3" marL="0" indent="685800" defTabSz="457200">
+          </a:p>
+          <a:p>
+            <a:pPr marL="0" lvl="3" indent="685800" defTabSz="457200">
               <a:spcBef>
                 <a:spcPts val="0"/>
               </a:spcBef>
@@ -3224,15 +3185,9 @@
               </a:rPr>
               <a:t>  });</a:t>
             </a:r>
-            <a:endParaRPr sz="1600">
-              <a:latin typeface="Helvetica"/>
-              <a:ea typeface="Helvetica"/>
-              <a:cs typeface="Helvetica"/>
-              <a:sym typeface="Helvetica"/>
-            </a:endParaRPr>
-          </a:p>
-          <a:p>
-            <a:pPr lvl="3" marL="0" indent="685800" defTabSz="457200">
+          </a:p>
+          <a:p>
+            <a:pPr marL="0" lvl="3" indent="685800" defTabSz="457200">
               <a:spcBef>
                 <a:spcPts val="0"/>
               </a:spcBef>
@@ -3262,7 +3217,7 @@
             </a:endParaRPr>
           </a:p>
           <a:p>
-            <a:pPr lvl="3" marL="0" indent="685800" defTabSz="457200">
+            <a:pPr marL="0" lvl="3" indent="685800" defTabSz="457200">
               <a:spcBef>
                 <a:spcPts val="0"/>
               </a:spcBef>
@@ -3293,15 +3248,9 @@
               </a:rPr>
               <a:t>  //whole stream was read</a:t>
             </a:r>
-            <a:endParaRPr sz="1600">
-              <a:latin typeface="Helvetica"/>
-              <a:ea typeface="Helvetica"/>
-              <a:cs typeface="Helvetica"/>
-              <a:sym typeface="Helvetica"/>
-            </a:endParaRPr>
-          </a:p>
-          <a:p>
-            <a:pPr lvl="3" marL="0" indent="685800" defTabSz="457200">
+          </a:p>
+          <a:p>
+            <a:pPr marL="0" lvl="3" indent="685800" defTabSz="457200">
               <a:spcBef>
                 <a:spcPts val="0"/>
               </a:spcBef>
@@ -3332,15 +3281,9 @@
               </a:rPr>
               <a:t>  response.on('end', function () {</a:t>
             </a:r>
-            <a:endParaRPr sz="1600">
-              <a:latin typeface="Helvetica"/>
-              <a:ea typeface="Helvetica"/>
-              <a:cs typeface="Helvetica"/>
-              <a:sym typeface="Helvetica"/>
-            </a:endParaRPr>
-          </a:p>
-          <a:p>
-            <a:pPr lvl="3" marL="0" indent="685800" defTabSz="457200">
+          </a:p>
+          <a:p>
+            <a:pPr marL="0" lvl="3" indent="685800" defTabSz="457200">
               <a:spcBef>
                 <a:spcPts val="0"/>
               </a:spcBef>
@@ -3371,15 +3314,9 @@
               </a:rPr>
               <a:t>    console.log(str);</a:t>
             </a:r>
-            <a:endParaRPr sz="1600">
-              <a:latin typeface="Helvetica"/>
-              <a:ea typeface="Helvetica"/>
-              <a:cs typeface="Helvetica"/>
-              <a:sym typeface="Helvetica"/>
-            </a:endParaRPr>
-          </a:p>
-          <a:p>
-            <a:pPr lvl="3" marL="0" indent="685800" defTabSz="457200">
+          </a:p>
+          <a:p>
+            <a:pPr marL="0" lvl="3" indent="685800" defTabSz="457200">
               <a:spcBef>
                 <a:spcPts val="0"/>
               </a:spcBef>
@@ -3410,15 +3347,9 @@
               </a:rPr>
               <a:t>  });</a:t>
             </a:r>
-            <a:endParaRPr sz="1600">
-              <a:latin typeface="Helvetica"/>
-              <a:ea typeface="Helvetica"/>
-              <a:cs typeface="Helvetica"/>
-              <a:sym typeface="Helvetica"/>
-            </a:endParaRPr>
-          </a:p>
-          <a:p>
-            <a:pPr lvl="3" marL="0" indent="685800" defTabSz="457200">
+          </a:p>
+          <a:p>
+            <a:pPr marL="0" lvl="3" indent="685800" defTabSz="457200">
               <a:spcBef>
                 <a:spcPts val="0"/>
               </a:spcBef>
@@ -3449,15 +3380,9 @@
               </a:rPr>
               <a:t>}</a:t>
             </a:r>
-            <a:endParaRPr sz="1600">
-              <a:latin typeface="Helvetica"/>
-              <a:ea typeface="Helvetica"/>
-              <a:cs typeface="Helvetica"/>
-              <a:sym typeface="Helvetica"/>
-            </a:endParaRPr>
-          </a:p>
-          <a:p>
-            <a:pPr lvl="3" marL="0" indent="685800" defTabSz="457200">
+          </a:p>
+          <a:p>
+            <a:pPr marL="0" lvl="3" indent="685800" defTabSz="457200">
               <a:spcBef>
                 <a:spcPts val="0"/>
               </a:spcBef>
@@ -3487,7 +3412,7 @@
             </a:endParaRPr>
           </a:p>
           <a:p>
-            <a:pPr lvl="3" marL="0" indent="685800" defTabSz="457200">
+            <a:pPr marL="0" lvl="3" indent="685800" defTabSz="457200">
               <a:spcBef>
                 <a:spcPts val="0"/>
               </a:spcBef>
@@ -3526,12 +3451,12 @@
   <p:clrMapOvr>
     <a:masterClrMapping/>
   </p:clrMapOvr>
-  <p:transition spd="med" advClick="1"/>
+  <p:transition spd="med"/>
 </p:sld>
 </file>
 
 <file path=ppt/slides/slide8.xml><?xml version="1.0" encoding="utf-8"?>
-<p:sld xmlns:a="http://schemas.openxmlformats.org/drawingml/2006/main" xmlns:r="http://schemas.openxmlformats.org/officeDocument/2006/relationships" xmlns:p="http://schemas.openxmlformats.org/presentationml/2006/main" showMasterSp="1" showMasterPhAnim="1">
+<p:sld xmlns:a="http://schemas.openxmlformats.org/drawingml/2006/main" xmlns:r="http://schemas.openxmlformats.org/officeDocument/2006/relationships" xmlns:p="http://schemas.openxmlformats.org/presentationml/2006/main">
   <p:cSld>
     <p:spTree>
       <p:nvGrpSpPr>
@@ -3550,7 +3475,9 @@
       <p:sp>
         <p:nvSpPr>
           <p:cNvPr id="52" name="Shape 52"/>
-          <p:cNvSpPr/>
+          <p:cNvSpPr>
+            <a:spLocks noGrp="1"/>
+          </p:cNvSpPr>
           <p:nvPr>
             <p:ph type="title"/>
           </p:nvPr>
@@ -3577,12 +3504,18 @@
       <p:sp>
         <p:nvSpPr>
           <p:cNvPr id="53" name="Shape 53"/>
-          <p:cNvSpPr/>
+          <p:cNvSpPr>
+            <a:spLocks noGrp="1"/>
+          </p:cNvSpPr>
           <p:nvPr>
             <p:ph type="body" idx="1"/>
           </p:nvPr>
         </p:nvSpPr>
         <p:spPr>
+          <a:xfrm>
+            <a:off x="952500" y="2603500"/>
+            <a:ext cx="11099800" cy="6286500"/>
+          </a:xfrm>
           <a:prstGeom prst="rect">
             <a:avLst/>
           </a:prstGeom>
@@ -3595,20 +3528,29 @@
               <a:defRPr sz="1800"/>
             </a:pPr>
             <a:r>
-              <a:rPr sz="3600"/>
+              <a:rPr sz="3600" dirty="0"/>
               <a:t>One nice package in NPM is express </a:t>
             </a:r>
-            <a:endParaRPr sz="3600"/>
           </a:p>
           <a:p>
             <a:pPr lvl="0">
               <a:defRPr sz="1800"/>
             </a:pPr>
             <a:r>
-              <a:rPr sz="3600"/>
-              <a:t>Express is a Web Application Server in NodeJS</a:t>
-            </a:r>
-            <a:endParaRPr sz="3600"/>
+              <a:rPr sz="3600" dirty="0"/>
+              <a:t>Express is a Web Application Server in </a:t>
+            </a:r>
+            <a:r>
+              <a:rPr sz="3600" dirty="0" err="1" smtClean="0"/>
+              <a:t>NodeJS</a:t>
+            </a:r>
+            <a:endParaRPr lang="en-GB" sz="3600" dirty="0" smtClean="0"/>
+          </a:p>
+          <a:p>
+            <a:pPr lvl="0">
+              <a:defRPr sz="1800"/>
+            </a:pPr>
+            <a:endParaRPr sz="3600" dirty="0"/>
           </a:p>
         </p:txBody>
       </p:sp>
@@ -3644,12 +3586,12 @@
   <p:clrMapOvr>
     <a:masterClrMapping/>
   </p:clrMapOvr>
-  <p:transition spd="med" advClick="1"/>
+  <p:transition spd="med"/>
 </p:sld>
 </file>
 
 <file path=ppt/slides/slide9.xml><?xml version="1.0" encoding="utf-8"?>
-<p:sld xmlns:a="http://schemas.openxmlformats.org/drawingml/2006/main" xmlns:r="http://schemas.openxmlformats.org/officeDocument/2006/relationships" xmlns:p="http://schemas.openxmlformats.org/presentationml/2006/main" showMasterSp="1" showMasterPhAnim="1">
+<p:sld xmlns:a="http://schemas.openxmlformats.org/drawingml/2006/main" xmlns:r="http://schemas.openxmlformats.org/officeDocument/2006/relationships" xmlns:p="http://schemas.openxmlformats.org/presentationml/2006/main">
   <p:cSld>
     <p:spTree>
       <p:nvGrpSpPr>
@@ -3668,7 +3610,9 @@
       <p:sp>
         <p:nvSpPr>
           <p:cNvPr id="56" name="Shape 56"/>
-          <p:cNvSpPr/>
+          <p:cNvSpPr>
+            <a:spLocks noGrp="1"/>
+          </p:cNvSpPr>
           <p:nvPr>
             <p:ph type="title"/>
           </p:nvPr>
@@ -3695,7 +3639,9 @@
       <p:sp>
         <p:nvSpPr>
           <p:cNvPr id="57" name="Shape 57"/>
-          <p:cNvSpPr/>
+          <p:cNvSpPr>
+            <a:spLocks noGrp="1"/>
+          </p:cNvSpPr>
           <p:nvPr>
             <p:ph type="body" idx="1"/>
           </p:nvPr>
@@ -3716,7 +3662,6 @@
               <a:rPr sz="3600"/>
               <a:t>Another powerful package</a:t>
             </a:r>
-            <a:endParaRPr sz="3600"/>
           </a:p>
           <a:p>
             <a:pPr lvl="0">
@@ -3726,7 +3671,6 @@
               <a:rPr sz="3600"/>
               <a:t>Transit layer for front end and middle layers</a:t>
             </a:r>
-            <a:endParaRPr sz="3600"/>
           </a:p>
           <a:p>
             <a:pPr lvl="0">
@@ -3736,7 +3680,6 @@
               <a:rPr sz="3600"/>
               <a:t>Client Server structure</a:t>
             </a:r>
-            <a:endParaRPr sz="3600"/>
           </a:p>
           <a:p>
             <a:pPr lvl="0">
@@ -3754,12 +3697,12 @@
   <p:clrMapOvr>
     <a:masterClrMapping/>
   </p:clrMapOvr>
-  <p:transition spd="med" advClick="1"/>
+  <p:transition spd="med"/>
 </p:sld>
 </file>
 
 <file path=ppt/theme/theme1.xml><?xml version="1.0" encoding="utf-8"?>
-<a:theme xmlns:a="http://schemas.openxmlformats.org/drawingml/2006/main" xmlns:r="http://schemas.openxmlformats.org/officeDocument/2006/relationships" name="White">
+<a:theme xmlns:a="http://schemas.openxmlformats.org/drawingml/2006/main" name="White">
   <a:themeElements>
     <a:clrScheme name="White">
       <a:dk1>
@@ -3885,7 +3828,7 @@
       <a:effectStyleLst>
         <a:effectStyle>
           <a:effectLst>
-            <a:outerShdw sx="100000" sy="100000" kx="0" ky="0" algn="b" rotWithShape="0" blurRad="38100" dist="25400" dir="5400000">
+            <a:outerShdw blurRad="38100" dist="25400" dir="5400000" rotWithShape="0">
               <a:srgbClr val="000000">
                 <a:alpha val="50000"/>
               </a:srgbClr>
@@ -3894,7 +3837,7 @@
         </a:effectStyle>
         <a:effectStyle>
           <a:effectLst>
-            <a:outerShdw sx="100000" sy="100000" kx="0" ky="0" algn="b" rotWithShape="0" blurRad="50800" dist="12700" dir="0">
+            <a:outerShdw blurRad="50800" dist="12700" rotWithShape="0">
               <a:srgbClr val="000000">
                 <a:alpha val="50000"/>
               </a:srgbClr>
@@ -3903,7 +3846,7 @@
         </a:effectStyle>
         <a:effectStyle>
           <a:effectLst>
-            <a:outerShdw sx="100000" sy="100000" kx="0" ky="0" algn="b" rotWithShape="0" blurRad="38100" dist="25400" dir="5400000">
+            <a:outerShdw blurRad="38100" dist="25400" dir="5400000" rotWithShape="0">
               <a:srgbClr val="000000">
                 <a:alpha val="50000"/>
               </a:srgbClr>
@@ -3967,8 +3910,8 @@
     <a:spDef>
       <a:spPr>
         <a:blipFill rotWithShape="1">
-          <a:blip r:embed="rId1"/>
-          <a:srcRect l="0" t="0" r="0" b="0"/>
+          <a:blip xmlns:r="http://schemas.openxmlformats.org/officeDocument/2006/relationships" r:embed="rId1"/>
+          <a:srcRect/>
           <a:tile tx="0" ty="0" sx="100000" sy="100000" flip="none" algn="tl"/>
         </a:blipFill>
         <a:ln w="12700" cap="flat">
@@ -3976,14 +3919,14 @@
           <a:miter lim="400000"/>
         </a:ln>
         <a:effectLst>
-          <a:outerShdw sx="100000" sy="100000" kx="0" ky="0" algn="b" rotWithShape="0" blurRad="38100" dist="25400" dir="5400000">
+          <a:outerShdw blurRad="38100" dist="25400" dir="5400000" rotWithShape="0">
             <a:srgbClr val="000000">
               <a:alpha val="50000"/>
             </a:srgbClr>
           </a:outerShdw>
         </a:effectLst>
       </a:spPr>
-      <a:bodyPr rot="0" spcFirstLastPara="1" vertOverflow="overflow" horzOverflow="overflow" vert="horz" wrap="square" lIns="50800" tIns="50800" rIns="50800" bIns="50800" numCol="1" spcCol="38100" rtlCol="0" anchor="ctr" upright="0">
+      <a:bodyPr rot="0" spcFirstLastPara="1" vertOverflow="overflow" horzOverflow="overflow" vert="horz" wrap="square" lIns="50800" tIns="50800" rIns="50800" bIns="50800" numCol="1" spcCol="38100" rtlCol="0" anchor="ctr">
         <a:spAutoFit/>
       </a:bodyPr>
       <a:lstStyle>
@@ -4002,7 +3945,7 @@
           <a:buFontTx/>
           <a:buNone/>
           <a:tabLst/>
-          <a:defRPr b="0" baseline="0" cap="none" i="0" spc="0" strike="noStrike" sz="2400" u="none" kumimoji="0" normalizeH="0">
+          <a:defRPr kumimoji="0" sz="2400" b="0" i="0" u="none" strike="noStrike" cap="none" spc="0" normalizeH="0" baseline="0">
             <a:ln>
               <a:noFill/>
             </a:ln>
@@ -4032,7 +3975,7 @@
           <a:buFontTx/>
           <a:buNone/>
           <a:tabLst/>
-          <a:defRPr b="0" baseline="0" cap="none" i="0" spc="0" strike="noStrike" sz="1800" u="none" kumimoji="0" normalizeH="0">
+          <a:defRPr kumimoji="0" sz="1800" b="0" i="0" u="none" strike="noStrike" cap="none" spc="0" normalizeH="0" baseline="0">
             <a:ln>
               <a:noFill/>
             </a:ln>
@@ -4058,7 +4001,7 @@
           <a:buFontTx/>
           <a:buNone/>
           <a:tabLst/>
-          <a:defRPr b="0" baseline="0" cap="none" i="0" spc="0" strike="noStrike" sz="1800" u="none" kumimoji="0" normalizeH="0">
+          <a:defRPr kumimoji="0" sz="1800" b="0" i="0" u="none" strike="noStrike" cap="none" spc="0" normalizeH="0" baseline="0">
             <a:ln>
               <a:noFill/>
             </a:ln>
@@ -4084,7 +4027,7 @@
           <a:buFontTx/>
           <a:buNone/>
           <a:tabLst/>
-          <a:defRPr b="0" baseline="0" cap="none" i="0" spc="0" strike="noStrike" sz="1800" u="none" kumimoji="0" normalizeH="0">
+          <a:defRPr kumimoji="0" sz="1800" b="0" i="0" u="none" strike="noStrike" cap="none" spc="0" normalizeH="0" baseline="0">
             <a:ln>
               <a:noFill/>
             </a:ln>
@@ -4110,7 +4053,7 @@
           <a:buFontTx/>
           <a:buNone/>
           <a:tabLst/>
-          <a:defRPr b="0" baseline="0" cap="none" i="0" spc="0" strike="noStrike" sz="1800" u="none" kumimoji="0" normalizeH="0">
+          <a:defRPr kumimoji="0" sz="1800" b="0" i="0" u="none" strike="noStrike" cap="none" spc="0" normalizeH="0" baseline="0">
             <a:ln>
               <a:noFill/>
             </a:ln>
@@ -4136,7 +4079,7 @@
           <a:buFontTx/>
           <a:buNone/>
           <a:tabLst/>
-          <a:defRPr b="0" baseline="0" cap="none" i="0" spc="0" strike="noStrike" sz="1800" u="none" kumimoji="0" normalizeH="0">
+          <a:defRPr kumimoji="0" sz="1800" b="0" i="0" u="none" strike="noStrike" cap="none" spc="0" normalizeH="0" baseline="0">
             <a:ln>
               <a:noFill/>
             </a:ln>
@@ -4162,7 +4105,7 @@
           <a:buFontTx/>
           <a:buNone/>
           <a:tabLst/>
-          <a:defRPr b="0" baseline="0" cap="none" i="0" spc="0" strike="noStrike" sz="1800" u="none" kumimoji="0" normalizeH="0">
+          <a:defRPr kumimoji="0" sz="1800" b="0" i="0" u="none" strike="noStrike" cap="none" spc="0" normalizeH="0" baseline="0">
             <a:ln>
               <a:noFill/>
             </a:ln>
@@ -4188,7 +4131,7 @@
           <a:buFontTx/>
           <a:buNone/>
           <a:tabLst/>
-          <a:defRPr b="0" baseline="0" cap="none" i="0" spc="0" strike="noStrike" sz="1800" u="none" kumimoji="0" normalizeH="0">
+          <a:defRPr kumimoji="0" sz="1800" b="0" i="0" u="none" strike="noStrike" cap="none" spc="0" normalizeH="0" baseline="0">
             <a:ln>
               <a:noFill/>
             </a:ln>
@@ -4214,7 +4157,7 @@
           <a:buFontTx/>
           <a:buNone/>
           <a:tabLst/>
-          <a:defRPr b="0" baseline="0" cap="none" i="0" spc="0" strike="noStrike" sz="1800" u="none" kumimoji="0" normalizeH="0">
+          <a:defRPr kumimoji="0" sz="1800" b="0" i="0" u="none" strike="noStrike" cap="none" spc="0" normalizeH="0" baseline="0">
             <a:ln>
               <a:noFill/>
             </a:ln>
@@ -4240,7 +4183,7 @@
           <a:buFontTx/>
           <a:buNone/>
           <a:tabLst/>
-          <a:defRPr b="0" baseline="0" cap="none" i="0" spc="0" strike="noStrike" sz="1800" u="none" kumimoji="0" normalizeH="0">
+          <a:defRPr kumimoji="0" sz="1800" b="0" i="0" u="none" strike="noStrike" cap="none" spc="0" normalizeH="0" baseline="0">
             <a:ln>
               <a:noFill/>
             </a:ln>
@@ -4253,9 +4196,15 @@
         </a:lvl9pPr>
       </a:lstStyle>
       <a:style>
-        <a:lnRef idx="0"/>
-        <a:fillRef idx="0"/>
-        <a:effectRef idx="0"/>
+        <a:lnRef idx="0">
+          <a:scrgbClr r="0" g="0" b="0"/>
+        </a:lnRef>
+        <a:fillRef idx="0">
+          <a:scrgbClr r="0" g="0" b="0"/>
+        </a:fillRef>
+        <a:effectRef idx="0">
+          <a:scrgbClr r="0" g="0" b="0"/>
+        </a:effectRef>
         <a:fontRef idx="none"/>
       </a:style>
     </a:spDef>
@@ -4271,7 +4220,7 @@
         </a:ln>
         <a:effectLst/>
       </a:spPr>
-      <a:bodyPr rot="0" spcFirstLastPara="1" vertOverflow="overflow" horzOverflow="overflow" vert="horz" wrap="square" lIns="91439" tIns="45719" rIns="91439" bIns="45719" numCol="1" spcCol="38100" rtlCol="0" anchor="t" upright="0">
+      <a:bodyPr rot="0" spcFirstLastPara="1" vertOverflow="overflow" horzOverflow="overflow" vert="horz" wrap="square" lIns="91439" tIns="45719" rIns="91439" bIns="45719" numCol="1" spcCol="38100" rtlCol="0" anchor="t">
         <a:noAutofit/>
       </a:bodyPr>
       <a:lstStyle>
@@ -4290,7 +4239,7 @@
           <a:buFontTx/>
           <a:buNone/>
           <a:tabLst/>
-          <a:defRPr b="0" baseline="0" cap="none" i="0" spc="0" strike="noStrike" sz="1800" u="none" kumimoji="0" normalizeH="0">
+          <a:defRPr kumimoji="0" sz="1800" b="0" i="0" u="none" strike="noStrike" cap="none" spc="0" normalizeH="0" baseline="0">
             <a:ln>
               <a:noFill/>
             </a:ln>
@@ -4316,7 +4265,7 @@
           <a:buFontTx/>
           <a:buNone/>
           <a:tabLst/>
-          <a:defRPr b="0" baseline="0" cap="none" i="0" spc="0" strike="noStrike" sz="1800" u="none" kumimoji="0" normalizeH="0">
+          <a:defRPr kumimoji="0" sz="1800" b="0" i="0" u="none" strike="noStrike" cap="none" spc="0" normalizeH="0" baseline="0">
             <a:ln>
               <a:noFill/>
             </a:ln>
@@ -4342,7 +4291,7 @@
           <a:buFontTx/>
           <a:buNone/>
           <a:tabLst/>
-          <a:defRPr b="0" baseline="0" cap="none" i="0" spc="0" strike="noStrike" sz="1800" u="none" kumimoji="0" normalizeH="0">
+          <a:defRPr kumimoji="0" sz="1800" b="0" i="0" u="none" strike="noStrike" cap="none" spc="0" normalizeH="0" baseline="0">
             <a:ln>
               <a:noFill/>
             </a:ln>
@@ -4368,7 +4317,7 @@
           <a:buFontTx/>
           <a:buNone/>
           <a:tabLst/>
-          <a:defRPr b="0" baseline="0" cap="none" i="0" spc="0" strike="noStrike" sz="1800" u="none" kumimoji="0" normalizeH="0">
+          <a:defRPr kumimoji="0" sz="1800" b="0" i="0" u="none" strike="noStrike" cap="none" spc="0" normalizeH="0" baseline="0">
             <a:ln>
               <a:noFill/>
             </a:ln>
@@ -4394,7 +4343,7 @@
           <a:buFontTx/>
           <a:buNone/>
           <a:tabLst/>
-          <a:defRPr b="0" baseline="0" cap="none" i="0" spc="0" strike="noStrike" sz="1800" u="none" kumimoji="0" normalizeH="0">
+          <a:defRPr kumimoji="0" sz="1800" b="0" i="0" u="none" strike="noStrike" cap="none" spc="0" normalizeH="0" baseline="0">
             <a:ln>
               <a:noFill/>
             </a:ln>
@@ -4420,7 +4369,7 @@
           <a:buFontTx/>
           <a:buNone/>
           <a:tabLst/>
-          <a:defRPr b="0" baseline="0" cap="none" i="0" spc="0" strike="noStrike" sz="1800" u="none" kumimoji="0" normalizeH="0">
+          <a:defRPr kumimoji="0" sz="1800" b="0" i="0" u="none" strike="noStrike" cap="none" spc="0" normalizeH="0" baseline="0">
             <a:ln>
               <a:noFill/>
             </a:ln>
@@ -4446,7 +4395,7 @@
           <a:buFontTx/>
           <a:buNone/>
           <a:tabLst/>
-          <a:defRPr b="0" baseline="0" cap="none" i="0" spc="0" strike="noStrike" sz="1800" u="none" kumimoji="0" normalizeH="0">
+          <a:defRPr kumimoji="0" sz="1800" b="0" i="0" u="none" strike="noStrike" cap="none" spc="0" normalizeH="0" baseline="0">
             <a:ln>
               <a:noFill/>
             </a:ln>
@@ -4472,7 +4421,7 @@
           <a:buFontTx/>
           <a:buNone/>
           <a:tabLst/>
-          <a:defRPr b="0" baseline="0" cap="none" i="0" spc="0" strike="noStrike" sz="1800" u="none" kumimoji="0" normalizeH="0">
+          <a:defRPr kumimoji="0" sz="1800" b="0" i="0" u="none" strike="noStrike" cap="none" spc="0" normalizeH="0" baseline="0">
             <a:ln>
               <a:noFill/>
             </a:ln>
@@ -4498,7 +4447,7 @@
           <a:buFontTx/>
           <a:buNone/>
           <a:tabLst/>
-          <a:defRPr b="0" baseline="0" cap="none" i="0" spc="0" strike="noStrike" sz="1800" u="none" kumimoji="0" normalizeH="0">
+          <a:defRPr kumimoji="0" sz="1800" b="0" i="0" u="none" strike="noStrike" cap="none" spc="0" normalizeH="0" baseline="0">
             <a:ln>
               <a:noFill/>
             </a:ln>
@@ -4524,7 +4473,7 @@
           <a:buFontTx/>
           <a:buNone/>
           <a:tabLst/>
-          <a:defRPr b="0" baseline="0" cap="none" i="0" spc="0" strike="noStrike" sz="1800" u="none" kumimoji="0" normalizeH="0">
+          <a:defRPr kumimoji="0" sz="1800" b="0" i="0" u="none" strike="noStrike" cap="none" spc="0" normalizeH="0" baseline="0">
             <a:ln>
               <a:noFill/>
             </a:ln>
@@ -4537,9 +4486,15 @@
         </a:lvl9pPr>
       </a:lstStyle>
       <a:style>
-        <a:lnRef idx="0"/>
-        <a:fillRef idx="0"/>
-        <a:effectRef idx="0"/>
+        <a:lnRef idx="0">
+          <a:scrgbClr r="0" g="0" b="0"/>
+        </a:lnRef>
+        <a:fillRef idx="0">
+          <a:scrgbClr r="0" g="0" b="0"/>
+        </a:fillRef>
+        <a:effectRef idx="0">
+          <a:scrgbClr r="0" g="0" b="0"/>
+        </a:effectRef>
         <a:fontRef idx="none"/>
       </a:style>
     </a:lnDef>
@@ -4552,7 +4507,7 @@
         </a:ln>
         <a:effectLst/>
       </a:spPr>
-      <a:bodyPr rot="0" spcFirstLastPara="1" vertOverflow="overflow" horzOverflow="overflow" vert="horz" wrap="square" lIns="50800" tIns="50800" rIns="50800" bIns="50800" numCol="1" spcCol="38100" rtlCol="0" anchor="ctr" upright="0">
+      <a:bodyPr rot="0" spcFirstLastPara="1" vertOverflow="overflow" horzOverflow="overflow" vert="horz" wrap="square" lIns="50800" tIns="50800" rIns="50800" bIns="50800" numCol="1" spcCol="38100" rtlCol="0" anchor="ctr">
         <a:spAutoFit/>
       </a:bodyPr>
       <a:lstStyle>
@@ -4571,7 +4526,7 @@
           <a:buFontTx/>
           <a:buNone/>
           <a:tabLst/>
-          <a:defRPr b="0" baseline="0" cap="none" i="0" spc="0" strike="noStrike" sz="3600" u="none" kumimoji="0" normalizeH="0">
+          <a:defRPr kumimoji="0" sz="3600" b="0" i="0" u="none" strike="noStrike" cap="none" spc="0" normalizeH="0" baseline="0">
             <a:ln>
               <a:noFill/>
             </a:ln>
@@ -4601,7 +4556,7 @@
           <a:buFontTx/>
           <a:buNone/>
           <a:tabLst/>
-          <a:defRPr b="0" baseline="0" cap="none" i="0" spc="0" strike="noStrike" sz="1800" u="none" kumimoji="0" normalizeH="0">
+          <a:defRPr kumimoji="0" sz="1800" b="0" i="0" u="none" strike="noStrike" cap="none" spc="0" normalizeH="0" baseline="0">
             <a:ln>
               <a:noFill/>
             </a:ln>
@@ -4627,7 +4582,7 @@
           <a:buFontTx/>
           <a:buNone/>
           <a:tabLst/>
-          <a:defRPr b="0" baseline="0" cap="none" i="0" spc="0" strike="noStrike" sz="1800" u="none" kumimoji="0" normalizeH="0">
+          <a:defRPr kumimoji="0" sz="1800" b="0" i="0" u="none" strike="noStrike" cap="none" spc="0" normalizeH="0" baseline="0">
             <a:ln>
               <a:noFill/>
             </a:ln>
@@ -4653,7 +4608,7 @@
           <a:buFontTx/>
           <a:buNone/>
           <a:tabLst/>
-          <a:defRPr b="0" baseline="0" cap="none" i="0" spc="0" strike="noStrike" sz="1800" u="none" kumimoji="0" normalizeH="0">
+          <a:defRPr kumimoji="0" sz="1800" b="0" i="0" u="none" strike="noStrike" cap="none" spc="0" normalizeH="0" baseline="0">
             <a:ln>
               <a:noFill/>
             </a:ln>
@@ -4679,7 +4634,7 @@
           <a:buFontTx/>
           <a:buNone/>
           <a:tabLst/>
-          <a:defRPr b="0" baseline="0" cap="none" i="0" spc="0" strike="noStrike" sz="1800" u="none" kumimoji="0" normalizeH="0">
+          <a:defRPr kumimoji="0" sz="1800" b="0" i="0" u="none" strike="noStrike" cap="none" spc="0" normalizeH="0" baseline="0">
             <a:ln>
               <a:noFill/>
             </a:ln>
@@ -4705,7 +4660,7 @@
           <a:buFontTx/>
           <a:buNone/>
           <a:tabLst/>
-          <a:defRPr b="0" baseline="0" cap="none" i="0" spc="0" strike="noStrike" sz="1800" u="none" kumimoji="0" normalizeH="0">
+          <a:defRPr kumimoji="0" sz="1800" b="0" i="0" u="none" strike="noStrike" cap="none" spc="0" normalizeH="0" baseline="0">
             <a:ln>
               <a:noFill/>
             </a:ln>
@@ -4731,7 +4686,7 @@
           <a:buFontTx/>
           <a:buNone/>
           <a:tabLst/>
-          <a:defRPr b="0" baseline="0" cap="none" i="0" spc="0" strike="noStrike" sz="1800" u="none" kumimoji="0" normalizeH="0">
+          <a:defRPr kumimoji="0" sz="1800" b="0" i="0" u="none" strike="noStrike" cap="none" spc="0" normalizeH="0" baseline="0">
             <a:ln>
               <a:noFill/>
             </a:ln>
@@ -4757,7 +4712,7 @@
           <a:buFontTx/>
           <a:buNone/>
           <a:tabLst/>
-          <a:defRPr b="0" baseline="0" cap="none" i="0" spc="0" strike="noStrike" sz="1800" u="none" kumimoji="0" normalizeH="0">
+          <a:defRPr kumimoji="0" sz="1800" b="0" i="0" u="none" strike="noStrike" cap="none" spc="0" normalizeH="0" baseline="0">
             <a:ln>
               <a:noFill/>
             </a:ln>
@@ -4783,7 +4738,7 @@
           <a:buFontTx/>
           <a:buNone/>
           <a:tabLst/>
-          <a:defRPr b="0" baseline="0" cap="none" i="0" spc="0" strike="noStrike" sz="1800" u="none" kumimoji="0" normalizeH="0">
+          <a:defRPr kumimoji="0" sz="1800" b="0" i="0" u="none" strike="noStrike" cap="none" spc="0" normalizeH="0" baseline="0">
             <a:ln>
               <a:noFill/>
             </a:ln>
@@ -4809,7 +4764,7 @@
           <a:buFontTx/>
           <a:buNone/>
           <a:tabLst/>
-          <a:defRPr b="0" baseline="0" cap="none" i="0" spc="0" strike="noStrike" sz="1800" u="none" kumimoji="0" normalizeH="0">
+          <a:defRPr kumimoji="0" sz="1800" b="0" i="0" u="none" strike="noStrike" cap="none" spc="0" normalizeH="0" baseline="0">
             <a:ln>
               <a:noFill/>
             </a:ln>
@@ -4822,18 +4777,25 @@
         </a:lvl9pPr>
       </a:lstStyle>
       <a:style>
-        <a:lnRef idx="0"/>
-        <a:fillRef idx="0"/>
-        <a:effectRef idx="0"/>
+        <a:lnRef idx="0">
+          <a:scrgbClr r="0" g="0" b="0"/>
+        </a:lnRef>
+        <a:fillRef idx="0">
+          <a:scrgbClr r="0" g="0" b="0"/>
+        </a:fillRef>
+        <a:effectRef idx="0">
+          <a:scrgbClr r="0" g="0" b="0"/>
+        </a:effectRef>
         <a:fontRef idx="none"/>
       </a:style>
     </a:txDef>
   </a:objectDefaults>
+  <a:extraClrSchemeLst/>
 </a:theme>
 </file>
 
 <file path=ppt/theme/theme2.xml><?xml version="1.0" encoding="utf-8"?>
-<a:theme xmlns:a="http://schemas.openxmlformats.org/drawingml/2006/main" xmlns:r="http://schemas.openxmlformats.org/officeDocument/2006/relationships" name="White">
+<a:theme xmlns:a="http://schemas.openxmlformats.org/drawingml/2006/main" name="White">
   <a:themeElements>
     <a:clrScheme name="White">
       <a:dk1>
@@ -4959,7 +4921,7 @@
       <a:effectStyleLst>
         <a:effectStyle>
           <a:effectLst>
-            <a:outerShdw sx="100000" sy="100000" kx="0" ky="0" algn="b" rotWithShape="0" blurRad="38100" dist="25400" dir="5400000">
+            <a:outerShdw blurRad="38100" dist="25400" dir="5400000" rotWithShape="0">
               <a:srgbClr val="000000">
                 <a:alpha val="50000"/>
               </a:srgbClr>
@@ -4968,7 +4930,7 @@
         </a:effectStyle>
         <a:effectStyle>
           <a:effectLst>
-            <a:outerShdw sx="100000" sy="100000" kx="0" ky="0" algn="b" rotWithShape="0" blurRad="50800" dist="12700" dir="0">
+            <a:outerShdw blurRad="50800" dist="12700" rotWithShape="0">
               <a:srgbClr val="000000">
                 <a:alpha val="50000"/>
               </a:srgbClr>
@@ -4977,7 +4939,7 @@
         </a:effectStyle>
         <a:effectStyle>
           <a:effectLst>
-            <a:outerShdw sx="100000" sy="100000" kx="0" ky="0" algn="b" rotWithShape="0" blurRad="38100" dist="25400" dir="5400000">
+            <a:outerShdw blurRad="38100" dist="25400" dir="5400000" rotWithShape="0">
               <a:srgbClr val="000000">
                 <a:alpha val="50000"/>
               </a:srgbClr>
@@ -5041,8 +5003,8 @@
     <a:spDef>
       <a:spPr>
         <a:blipFill rotWithShape="1">
-          <a:blip r:embed="rId1"/>
-          <a:srcRect l="0" t="0" r="0" b="0"/>
+          <a:blip xmlns:r="http://schemas.openxmlformats.org/officeDocument/2006/relationships" r:embed="rId1"/>
+          <a:srcRect/>
           <a:tile tx="0" ty="0" sx="100000" sy="100000" flip="none" algn="tl"/>
         </a:blipFill>
         <a:ln w="12700" cap="flat">
@@ -5050,14 +5012,14 @@
           <a:miter lim="400000"/>
         </a:ln>
         <a:effectLst>
-          <a:outerShdw sx="100000" sy="100000" kx="0" ky="0" algn="b" rotWithShape="0" blurRad="38100" dist="25400" dir="5400000">
+          <a:outerShdw blurRad="38100" dist="25400" dir="5400000" rotWithShape="0">
             <a:srgbClr val="000000">
               <a:alpha val="50000"/>
             </a:srgbClr>
           </a:outerShdw>
         </a:effectLst>
       </a:spPr>
-      <a:bodyPr rot="0" spcFirstLastPara="1" vertOverflow="overflow" horzOverflow="overflow" vert="horz" wrap="square" lIns="50800" tIns="50800" rIns="50800" bIns="50800" numCol="1" spcCol="38100" rtlCol="0" anchor="ctr" upright="0">
+      <a:bodyPr rot="0" spcFirstLastPara="1" vertOverflow="overflow" horzOverflow="overflow" vert="horz" wrap="square" lIns="50800" tIns="50800" rIns="50800" bIns="50800" numCol="1" spcCol="38100" rtlCol="0" anchor="ctr">
         <a:spAutoFit/>
       </a:bodyPr>
       <a:lstStyle>
@@ -5076,7 +5038,7 @@
           <a:buFontTx/>
           <a:buNone/>
           <a:tabLst/>
-          <a:defRPr b="0" baseline="0" cap="none" i="0" spc="0" strike="noStrike" sz="2400" u="none" kumimoji="0" normalizeH="0">
+          <a:defRPr kumimoji="0" sz="2400" b="0" i="0" u="none" strike="noStrike" cap="none" spc="0" normalizeH="0" baseline="0">
             <a:ln>
               <a:noFill/>
             </a:ln>
@@ -5106,7 +5068,7 @@
           <a:buFontTx/>
           <a:buNone/>
           <a:tabLst/>
-          <a:defRPr b="0" baseline="0" cap="none" i="0" spc="0" strike="noStrike" sz="1800" u="none" kumimoji="0" normalizeH="0">
+          <a:defRPr kumimoji="0" sz="1800" b="0" i="0" u="none" strike="noStrike" cap="none" spc="0" normalizeH="0" baseline="0">
             <a:ln>
               <a:noFill/>
             </a:ln>
@@ -5132,7 +5094,7 @@
           <a:buFontTx/>
           <a:buNone/>
           <a:tabLst/>
-          <a:defRPr b="0" baseline="0" cap="none" i="0" spc="0" strike="noStrike" sz="1800" u="none" kumimoji="0" normalizeH="0">
+          <a:defRPr kumimoji="0" sz="1800" b="0" i="0" u="none" strike="noStrike" cap="none" spc="0" normalizeH="0" baseline="0">
             <a:ln>
               <a:noFill/>
             </a:ln>
@@ -5158,7 +5120,7 @@
           <a:buFontTx/>
           <a:buNone/>
           <a:tabLst/>
-          <a:defRPr b="0" baseline="0" cap="none" i="0" spc="0" strike="noStrike" sz="1800" u="none" kumimoji="0" normalizeH="0">
+          <a:defRPr kumimoji="0" sz="1800" b="0" i="0" u="none" strike="noStrike" cap="none" spc="0" normalizeH="0" baseline="0">
             <a:ln>
               <a:noFill/>
             </a:ln>
@@ -5184,7 +5146,7 @@
           <a:buFontTx/>
           <a:buNone/>
           <a:tabLst/>
-          <a:defRPr b="0" baseline="0" cap="none" i="0" spc="0" strike="noStrike" sz="1800" u="none" kumimoji="0" normalizeH="0">
+          <a:defRPr kumimoji="0" sz="1800" b="0" i="0" u="none" strike="noStrike" cap="none" spc="0" normalizeH="0" baseline="0">
             <a:ln>
               <a:noFill/>
             </a:ln>
@@ -5210,7 +5172,7 @@
           <a:buFontTx/>
           <a:buNone/>
           <a:tabLst/>
-          <a:defRPr b="0" baseline="0" cap="none" i="0" spc="0" strike="noStrike" sz="1800" u="none" kumimoji="0" normalizeH="0">
+          <a:defRPr kumimoji="0" sz="1800" b="0" i="0" u="none" strike="noStrike" cap="none" spc="0" normalizeH="0" baseline="0">
             <a:ln>
               <a:noFill/>
             </a:ln>
@@ -5236,7 +5198,7 @@
           <a:buFontTx/>
           <a:buNone/>
           <a:tabLst/>
-          <a:defRPr b="0" baseline="0" cap="none" i="0" spc="0" strike="noStrike" sz="1800" u="none" kumimoji="0" normalizeH="0">
+          <a:defRPr kumimoji="0" sz="1800" b="0" i="0" u="none" strike="noStrike" cap="none" spc="0" normalizeH="0" baseline="0">
             <a:ln>
               <a:noFill/>
             </a:ln>
@@ -5262,7 +5224,7 @@
           <a:buFontTx/>
           <a:buNone/>
           <a:tabLst/>
-          <a:defRPr b="0" baseline="0" cap="none" i="0" spc="0" strike="noStrike" sz="1800" u="none" kumimoji="0" normalizeH="0">
+          <a:defRPr kumimoji="0" sz="1800" b="0" i="0" u="none" strike="noStrike" cap="none" spc="0" normalizeH="0" baseline="0">
             <a:ln>
               <a:noFill/>
             </a:ln>
@@ -5288,7 +5250,7 @@
           <a:buFontTx/>
           <a:buNone/>
           <a:tabLst/>
-          <a:defRPr b="0" baseline="0" cap="none" i="0" spc="0" strike="noStrike" sz="1800" u="none" kumimoji="0" normalizeH="0">
+          <a:defRPr kumimoji="0" sz="1800" b="0" i="0" u="none" strike="noStrike" cap="none" spc="0" normalizeH="0" baseline="0">
             <a:ln>
               <a:noFill/>
             </a:ln>
@@ -5314,7 +5276,7 @@
           <a:buFontTx/>
           <a:buNone/>
           <a:tabLst/>
-          <a:defRPr b="0" baseline="0" cap="none" i="0" spc="0" strike="noStrike" sz="1800" u="none" kumimoji="0" normalizeH="0">
+          <a:defRPr kumimoji="0" sz="1800" b="0" i="0" u="none" strike="noStrike" cap="none" spc="0" normalizeH="0" baseline="0">
             <a:ln>
               <a:noFill/>
             </a:ln>
@@ -5327,9 +5289,15 @@
         </a:lvl9pPr>
       </a:lstStyle>
       <a:style>
-        <a:lnRef idx="0"/>
-        <a:fillRef idx="0"/>
-        <a:effectRef idx="0"/>
+        <a:lnRef idx="0">
+          <a:scrgbClr r="0" g="0" b="0"/>
+        </a:lnRef>
+        <a:fillRef idx="0">
+          <a:scrgbClr r="0" g="0" b="0"/>
+        </a:fillRef>
+        <a:effectRef idx="0">
+          <a:scrgbClr r="0" g="0" b="0"/>
+        </a:effectRef>
         <a:fontRef idx="none"/>
       </a:style>
     </a:spDef>
@@ -5345,7 +5313,7 @@
         </a:ln>
         <a:effectLst/>
       </a:spPr>
-      <a:bodyPr rot="0" spcFirstLastPara="1" vertOverflow="overflow" horzOverflow="overflow" vert="horz" wrap="square" lIns="91439" tIns="45719" rIns="91439" bIns="45719" numCol="1" spcCol="38100" rtlCol="0" anchor="t" upright="0">
+      <a:bodyPr rot="0" spcFirstLastPara="1" vertOverflow="overflow" horzOverflow="overflow" vert="horz" wrap="square" lIns="91439" tIns="45719" rIns="91439" bIns="45719" numCol="1" spcCol="38100" rtlCol="0" anchor="t">
         <a:noAutofit/>
       </a:bodyPr>
       <a:lstStyle>
@@ -5364,7 +5332,7 @@
           <a:buFontTx/>
           <a:buNone/>
           <a:tabLst/>
-          <a:defRPr b="0" baseline="0" cap="none" i="0" spc="0" strike="noStrike" sz="1800" u="none" kumimoji="0" normalizeH="0">
+          <a:defRPr kumimoji="0" sz="1800" b="0" i="0" u="none" strike="noStrike" cap="none" spc="0" normalizeH="0" baseline="0">
             <a:ln>
               <a:noFill/>
             </a:ln>
@@ -5390,7 +5358,7 @@
           <a:buFontTx/>
           <a:buNone/>
           <a:tabLst/>
-          <a:defRPr b="0" baseline="0" cap="none" i="0" spc="0" strike="noStrike" sz="1800" u="none" kumimoji="0" normalizeH="0">
+          <a:defRPr kumimoji="0" sz="1800" b="0" i="0" u="none" strike="noStrike" cap="none" spc="0" normalizeH="0" baseline="0">
             <a:ln>
               <a:noFill/>
             </a:ln>
@@ -5416,7 +5384,7 @@
           <a:buFontTx/>
           <a:buNone/>
           <a:tabLst/>
-          <a:defRPr b="0" baseline="0" cap="none" i="0" spc="0" strike="noStrike" sz="1800" u="none" kumimoji="0" normalizeH="0">
+          <a:defRPr kumimoji="0" sz="1800" b="0" i="0" u="none" strike="noStrike" cap="none" spc="0" normalizeH="0" baseline="0">
             <a:ln>
               <a:noFill/>
             </a:ln>
@@ -5442,7 +5410,7 @@
           <a:buFontTx/>
           <a:buNone/>
           <a:tabLst/>
-          <a:defRPr b="0" baseline="0" cap="none" i="0" spc="0" strike="noStrike" sz="1800" u="none" kumimoji="0" normalizeH="0">
+          <a:defRPr kumimoji="0" sz="1800" b="0" i="0" u="none" strike="noStrike" cap="none" spc="0" normalizeH="0" baseline="0">
             <a:ln>
               <a:noFill/>
             </a:ln>
@@ -5468,7 +5436,7 @@
           <a:buFontTx/>
           <a:buNone/>
           <a:tabLst/>
-          <a:defRPr b="0" baseline="0" cap="none" i="0" spc="0" strike="noStrike" sz="1800" u="none" kumimoji="0" normalizeH="0">
+          <a:defRPr kumimoji="0" sz="1800" b="0" i="0" u="none" strike="noStrike" cap="none" spc="0" normalizeH="0" baseline="0">
             <a:ln>
               <a:noFill/>
             </a:ln>
@@ -5494,7 +5462,7 @@
           <a:buFontTx/>
           <a:buNone/>
           <a:tabLst/>
-          <a:defRPr b="0" baseline="0" cap="none" i="0" spc="0" strike="noStrike" sz="1800" u="none" kumimoji="0" normalizeH="0">
+          <a:defRPr kumimoji="0" sz="1800" b="0" i="0" u="none" strike="noStrike" cap="none" spc="0" normalizeH="0" baseline="0">
             <a:ln>
               <a:noFill/>
             </a:ln>
@@ -5520,7 +5488,7 @@
           <a:buFontTx/>
           <a:buNone/>
           <a:tabLst/>
-          <a:defRPr b="0" baseline="0" cap="none" i="0" spc="0" strike="noStrike" sz="1800" u="none" kumimoji="0" normalizeH="0">
+          <a:defRPr kumimoji="0" sz="1800" b="0" i="0" u="none" strike="noStrike" cap="none" spc="0" normalizeH="0" baseline="0">
             <a:ln>
               <a:noFill/>
             </a:ln>
@@ -5546,7 +5514,7 @@
           <a:buFontTx/>
           <a:buNone/>
           <a:tabLst/>
-          <a:defRPr b="0" baseline="0" cap="none" i="0" spc="0" strike="noStrike" sz="1800" u="none" kumimoji="0" normalizeH="0">
+          <a:defRPr kumimoji="0" sz="1800" b="0" i="0" u="none" strike="noStrike" cap="none" spc="0" normalizeH="0" baseline="0">
             <a:ln>
               <a:noFill/>
             </a:ln>
@@ -5572,7 +5540,7 @@
           <a:buFontTx/>
           <a:buNone/>
           <a:tabLst/>
-          <a:defRPr b="0" baseline="0" cap="none" i="0" spc="0" strike="noStrike" sz="1800" u="none" kumimoji="0" normalizeH="0">
+          <a:defRPr kumimoji="0" sz="1800" b="0" i="0" u="none" strike="noStrike" cap="none" spc="0" normalizeH="0" baseline="0">
             <a:ln>
               <a:noFill/>
             </a:ln>
@@ -5598,7 +5566,7 @@
           <a:buFontTx/>
           <a:buNone/>
           <a:tabLst/>
-          <a:defRPr b="0" baseline="0" cap="none" i="0" spc="0" strike="noStrike" sz="1800" u="none" kumimoji="0" normalizeH="0">
+          <a:defRPr kumimoji="0" sz="1800" b="0" i="0" u="none" strike="noStrike" cap="none" spc="0" normalizeH="0" baseline="0">
             <a:ln>
               <a:noFill/>
             </a:ln>
@@ -5611,9 +5579,15 @@
         </a:lvl9pPr>
       </a:lstStyle>
       <a:style>
-        <a:lnRef idx="0"/>
-        <a:fillRef idx="0"/>
-        <a:effectRef idx="0"/>
+        <a:lnRef idx="0">
+          <a:scrgbClr r="0" g="0" b="0"/>
+        </a:lnRef>
+        <a:fillRef idx="0">
+          <a:scrgbClr r="0" g="0" b="0"/>
+        </a:fillRef>
+        <a:effectRef idx="0">
+          <a:scrgbClr r="0" g="0" b="0"/>
+        </a:effectRef>
         <a:fontRef idx="none"/>
       </a:style>
     </a:lnDef>
@@ -5626,7 +5600,7 @@
         </a:ln>
         <a:effectLst/>
       </a:spPr>
-      <a:bodyPr rot="0" spcFirstLastPara="1" vertOverflow="overflow" horzOverflow="overflow" vert="horz" wrap="square" lIns="50800" tIns="50800" rIns="50800" bIns="50800" numCol="1" spcCol="38100" rtlCol="0" anchor="ctr" upright="0">
+      <a:bodyPr rot="0" spcFirstLastPara="1" vertOverflow="overflow" horzOverflow="overflow" vert="horz" wrap="square" lIns="50800" tIns="50800" rIns="50800" bIns="50800" numCol="1" spcCol="38100" rtlCol="0" anchor="ctr">
         <a:spAutoFit/>
       </a:bodyPr>
       <a:lstStyle>
@@ -5645,7 +5619,7 @@
           <a:buFontTx/>
           <a:buNone/>
           <a:tabLst/>
-          <a:defRPr b="0" baseline="0" cap="none" i="0" spc="0" strike="noStrike" sz="3600" u="none" kumimoji="0" normalizeH="0">
+          <a:defRPr kumimoji="0" sz="3600" b="0" i="0" u="none" strike="noStrike" cap="none" spc="0" normalizeH="0" baseline="0">
             <a:ln>
               <a:noFill/>
             </a:ln>
@@ -5675,7 +5649,7 @@
           <a:buFontTx/>
           <a:buNone/>
           <a:tabLst/>
-          <a:defRPr b="0" baseline="0" cap="none" i="0" spc="0" strike="noStrike" sz="1800" u="none" kumimoji="0" normalizeH="0">
+          <a:defRPr kumimoji="0" sz="1800" b="0" i="0" u="none" strike="noStrike" cap="none" spc="0" normalizeH="0" baseline="0">
             <a:ln>
               <a:noFill/>
             </a:ln>
@@ -5701,7 +5675,7 @@
           <a:buFontTx/>
           <a:buNone/>
           <a:tabLst/>
-          <a:defRPr b="0" baseline="0" cap="none" i="0" spc="0" strike="noStrike" sz="1800" u="none" kumimoji="0" normalizeH="0">
+          <a:defRPr kumimoji="0" sz="1800" b="0" i="0" u="none" strike="noStrike" cap="none" spc="0" normalizeH="0" baseline="0">
             <a:ln>
               <a:noFill/>
             </a:ln>
@@ -5727,7 +5701,7 @@
           <a:buFontTx/>
           <a:buNone/>
           <a:tabLst/>
-          <a:defRPr b="0" baseline="0" cap="none" i="0" spc="0" strike="noStrike" sz="1800" u="none" kumimoji="0" normalizeH="0">
+          <a:defRPr kumimoji="0" sz="1800" b="0" i="0" u="none" strike="noStrike" cap="none" spc="0" normalizeH="0" baseline="0">
             <a:ln>
               <a:noFill/>
             </a:ln>
@@ -5753,7 +5727,7 @@
           <a:buFontTx/>
           <a:buNone/>
           <a:tabLst/>
-          <a:defRPr b="0" baseline="0" cap="none" i="0" spc="0" strike="noStrike" sz="1800" u="none" kumimoji="0" normalizeH="0">
+          <a:defRPr kumimoji="0" sz="1800" b="0" i="0" u="none" strike="noStrike" cap="none" spc="0" normalizeH="0" baseline="0">
             <a:ln>
               <a:noFill/>
             </a:ln>
@@ -5779,7 +5753,7 @@
           <a:buFontTx/>
           <a:buNone/>
           <a:tabLst/>
-          <a:defRPr b="0" baseline="0" cap="none" i="0" spc="0" strike="noStrike" sz="1800" u="none" kumimoji="0" normalizeH="0">
+          <a:defRPr kumimoji="0" sz="1800" b="0" i="0" u="none" strike="noStrike" cap="none" spc="0" normalizeH="0" baseline="0">
             <a:ln>
               <a:noFill/>
             </a:ln>
@@ -5805,7 +5779,7 @@
           <a:buFontTx/>
           <a:buNone/>
           <a:tabLst/>
-          <a:defRPr b="0" baseline="0" cap="none" i="0" spc="0" strike="noStrike" sz="1800" u="none" kumimoji="0" normalizeH="0">
+          <a:defRPr kumimoji="0" sz="1800" b="0" i="0" u="none" strike="noStrike" cap="none" spc="0" normalizeH="0" baseline="0">
             <a:ln>
               <a:noFill/>
             </a:ln>
@@ -5831,7 +5805,7 @@
           <a:buFontTx/>
           <a:buNone/>
           <a:tabLst/>
-          <a:defRPr b="0" baseline="0" cap="none" i="0" spc="0" strike="noStrike" sz="1800" u="none" kumimoji="0" normalizeH="0">
+          <a:defRPr kumimoji="0" sz="1800" b="0" i="0" u="none" strike="noStrike" cap="none" spc="0" normalizeH="0" baseline="0">
             <a:ln>
               <a:noFill/>
             </a:ln>
@@ -5857,7 +5831,7 @@
           <a:buFontTx/>
           <a:buNone/>
           <a:tabLst/>
-          <a:defRPr b="0" baseline="0" cap="none" i="0" spc="0" strike="noStrike" sz="1800" u="none" kumimoji="0" normalizeH="0">
+          <a:defRPr kumimoji="0" sz="1800" b="0" i="0" u="none" strike="noStrike" cap="none" spc="0" normalizeH="0" baseline="0">
             <a:ln>
               <a:noFill/>
             </a:ln>
@@ -5883,7 +5857,7 @@
           <a:buFontTx/>
           <a:buNone/>
           <a:tabLst/>
-          <a:defRPr b="0" baseline="0" cap="none" i="0" spc="0" strike="noStrike" sz="1800" u="none" kumimoji="0" normalizeH="0">
+          <a:defRPr kumimoji="0" sz="1800" b="0" i="0" u="none" strike="noStrike" cap="none" spc="0" normalizeH="0" baseline="0">
             <a:ln>
               <a:noFill/>
             </a:ln>
@@ -5896,12 +5870,19 @@
         </a:lvl9pPr>
       </a:lstStyle>
       <a:style>
-        <a:lnRef idx="0"/>
-        <a:fillRef idx="0"/>
-        <a:effectRef idx="0"/>
+        <a:lnRef idx="0">
+          <a:scrgbClr r="0" g="0" b="0"/>
+        </a:lnRef>
+        <a:fillRef idx="0">
+          <a:scrgbClr r="0" g="0" b="0"/>
+        </a:fillRef>
+        <a:effectRef idx="0">
+          <a:scrgbClr r="0" g="0" b="0"/>
+        </a:effectRef>
         <a:fontRef idx="none"/>
       </a:style>
     </a:txDef>
   </a:objectDefaults>
+  <a:extraClrSchemeLst/>
 </a:theme>
 </file>
</xml_diff>